<commit_message>
Some more fleshing out of the parallel section
</commit_message>
<xml_diff>
--- a/CBG-2014-05-06.pptx
+++ b/CBG-2014-05-06.pptx
@@ -5,7 +5,7 @@
     <p:sldMasterId id="2147483648" r:id="rId1"/>
   </p:sldMasterIdLst>
   <p:notesMasterIdLst>
-    <p:notesMasterId r:id="rId26"/>
+    <p:notesMasterId r:id="rId30"/>
   </p:notesMasterIdLst>
   <p:sldIdLst>
     <p:sldId id="256" r:id="rId2"/>
@@ -27,11 +27,15 @@
     <p:sldId id="279" r:id="rId18"/>
     <p:sldId id="281" r:id="rId19"/>
     <p:sldId id="282" r:id="rId20"/>
-    <p:sldId id="265" r:id="rId21"/>
-    <p:sldId id="264" r:id="rId22"/>
-    <p:sldId id="261" r:id="rId23"/>
-    <p:sldId id="262" r:id="rId24"/>
-    <p:sldId id="263" r:id="rId25"/>
+    <p:sldId id="285" r:id="rId21"/>
+    <p:sldId id="265" r:id="rId22"/>
+    <p:sldId id="284" r:id="rId23"/>
+    <p:sldId id="264" r:id="rId24"/>
+    <p:sldId id="262" r:id="rId25"/>
+    <p:sldId id="261" r:id="rId26"/>
+    <p:sldId id="286" r:id="rId27"/>
+    <p:sldId id="263" r:id="rId28"/>
+    <p:sldId id="283" r:id="rId29"/>
   </p:sldIdLst>
   <p:sldSz cx="9144000" cy="6858000" type="screen4x3"/>
   <p:notesSz cx="6858000" cy="9144000"/>
@@ -215,7 +219,7 @@
           <a:p>
             <a:fld id="{98EBBA48-4CEA-FF4B-8E04-86A5D1C09742}" type="datetimeFigureOut">
               <a:rPr lang="en-US" smtClean="0"/>
-              <a:t>5/6/14</a:t>
+              <a:t>5/19/14</a:t>
             </a:fld>
             <a:endParaRPr lang="en-US"/>
           </a:p>
@@ -640,7 +644,6 @@
               <a:rPr lang="en-US" baseline="0" dirty="0" smtClean="0"/>
               <a:t>.  Why not just produce a nexus file to begin with?</a:t>
             </a:r>
-            <a:endParaRPr lang="en-US" baseline="0" dirty="0" smtClean="0"/>
           </a:p>
         </p:txBody>
       </p:sp>
@@ -888,7 +891,6 @@
               <a:rPr lang="en-US" baseline="0" dirty="0" smtClean="0"/>
               <a:t>That’s pretty nifty, but notice that our other recipes are still hardcoded.  Let’s fix that.</a:t>
             </a:r>
-            <a:endParaRPr lang="en-US" baseline="0" dirty="0" smtClean="0"/>
           </a:p>
         </p:txBody>
       </p:sp>
@@ -1236,7 +1238,6 @@
               <a:rPr lang="en-US" baseline="0" dirty="0" smtClean="0"/>
               <a:t> which make will delete when it’s done.  This is just a cleanliness thing so you have less files to look at in your directory.  But sometimes you want to keep those files around, especially if they take a while to produce.  muscle, for example, might take a long time on a large set of sequences.  There’s a way to tell make that it shouldn’t delete certain intermediate files, that certain files are…  precious.</a:t>
             </a:r>
-            <a:endParaRPr lang="en-US" baseline="0" dirty="0" smtClean="0"/>
           </a:p>
         </p:txBody>
       </p:sp>
@@ -1426,6 +1427,37 @@
           <a:p>
             <a:r>
               <a:rPr lang="en-US" dirty="0" smtClean="0"/>
+              <a:t>Variables</a:t>
+            </a:r>
+            <a:r>
+              <a:rPr lang="en-US" baseline="0" dirty="0" smtClean="0"/>
+              <a:t> help reduce repetition in directory names or other commonly used parameters.  You can override them when running make: `make hello NAME=Jim`  Variable names longer than a single character need to be surrounded by parentheses.</a:t>
+            </a:r>
+          </a:p>
+          <a:p>
+            <a:endParaRPr lang="en-US" baseline="0" dirty="0" smtClean="0"/>
+          </a:p>
+          <a:p>
+            <a:r>
+              <a:rPr lang="en-US" baseline="0" dirty="0" smtClean="0"/>
+              <a:t>Since dollar signs introduce a variable in </a:t>
+            </a:r>
+            <a:r>
+              <a:rPr lang="en-US" baseline="0" dirty="0" err="1" smtClean="0"/>
+              <a:t>Makefiles</a:t>
+            </a:r>
+            <a:r>
+              <a:rPr lang="en-US" baseline="0" dirty="0" smtClean="0"/>
+              <a:t>, to use an actual dollar sign you need to type it twice.</a:t>
+            </a:r>
+            <a:endParaRPr lang="en-US" dirty="0" smtClean="0"/>
+          </a:p>
+          <a:p>
+            <a:endParaRPr lang="en-US" dirty="0" smtClean="0"/>
+          </a:p>
+          <a:p>
+            <a:r>
+              <a:rPr lang="en-US" dirty="0" smtClean="0"/>
               <a:t>You can see that targets don’t have to be files.  Make doesn’t create a target file itself, that’s up to the recipe.</a:t>
             </a:r>
             <a:r>
@@ -1704,17 +1736,59 @@
             </a:pPr>
             <a:r>
               <a:rPr lang="en-US" baseline="0" dirty="0" smtClean="0"/>
-              <a:t>$^ is the special variable that lists all the prerequisites, separated by spaces.  In this case, it’ll expand to the script name and the input filename to make the first two arguments to </a:t>
+              <a:t>$^ is an automatic variable that lists all the prerequisites, separated by spaces.  In this case, it’ll expand to the script name and the input filename to make the first two arguments to </a:t>
             </a:r>
             <a:r>
               <a:rPr lang="en-US" baseline="0" dirty="0" err="1" smtClean="0"/>
               <a:t>perl</a:t>
             </a:r>
             <a:r>
-              <a:rPr lang="en-US" baseline="0" smtClean="0"/>
+              <a:rPr lang="en-US" baseline="0" dirty="0" smtClean="0"/>
               <a:t>.</a:t>
             </a:r>
+          </a:p>
+          <a:p>
+            <a:pPr marL="0" marR="0" indent="0" algn="l" defTabSz="457200" rtl="0" eaLnBrk="1" fontAlgn="auto" latinLnBrk="0" hangingPunct="1">
+              <a:lnSpc>
+                <a:spcPct val="100000"/>
+              </a:lnSpc>
+              <a:spcBef>
+                <a:spcPts val="0"/>
+              </a:spcBef>
+              <a:spcAft>
+                <a:spcPts val="0"/>
+              </a:spcAft>
+              <a:buClrTx/>
+              <a:buSzTx/>
+              <a:buFontTx/>
+              <a:buNone/>
+              <a:tabLst/>
+              <a:defRPr/>
+            </a:pPr>
             <a:endParaRPr lang="en-US" baseline="0" dirty="0" smtClean="0"/>
+          </a:p>
+          <a:p>
+            <a:pPr marL="0" marR="0" indent="0" algn="l" defTabSz="457200" rtl="0" eaLnBrk="1" fontAlgn="auto" latinLnBrk="0" hangingPunct="1">
+              <a:lnSpc>
+                <a:spcPct val="100000"/>
+              </a:lnSpc>
+              <a:spcBef>
+                <a:spcPts val="0"/>
+              </a:spcBef>
+              <a:spcAft>
+                <a:spcPts val="0"/>
+              </a:spcAft>
+              <a:buClrTx/>
+              <a:buSzTx/>
+              <a:buFontTx/>
+              <a:buNone/>
+              <a:tabLst/>
+              <a:defRPr/>
+            </a:pPr>
+            <a:r>
+              <a:rPr lang="en-US" baseline="0" dirty="0" smtClean="0"/>
+              <a:t>There are other variables too, such as $* which is the just the shared stem, or wildcard part, of the filename.</a:t>
+            </a:r>
           </a:p>
         </p:txBody>
       </p:sp>
@@ -1798,13 +1872,73 @@
           <a:bodyPr/>
           <a:lstStyle/>
           <a:p>
+            <a:pPr marL="0" marR="0" indent="0" algn="l" defTabSz="457200" rtl="0" eaLnBrk="1" fontAlgn="auto" latinLnBrk="0" hangingPunct="1">
+              <a:lnSpc>
+                <a:spcPct val="100000"/>
+              </a:lnSpc>
+              <a:spcBef>
+                <a:spcPts val="0"/>
+              </a:spcBef>
+              <a:spcAft>
+                <a:spcPts val="0"/>
+              </a:spcAft>
+              <a:buClrTx/>
+              <a:buSzTx/>
+              <a:buFontTx/>
+              <a:buNone/>
+              <a:tabLst/>
+              <a:defRPr/>
+            </a:pPr>
+            <a:r>
+              <a:rPr lang="en-US" baseline="0" dirty="0" smtClean="0"/>
+              <a:t>Assertions declare that an assumption you’re making about the data must be true or the computer shouldn’t continue.  You generally express this in terms of a simple condition that should hold, like, “All the sequence names should match this pattern.”</a:t>
+            </a:r>
+          </a:p>
+          <a:p>
+            <a:pPr marL="0" marR="0" indent="0" algn="l" defTabSz="457200" rtl="0" eaLnBrk="1" fontAlgn="auto" latinLnBrk="0" hangingPunct="1">
+              <a:lnSpc>
+                <a:spcPct val="100000"/>
+              </a:lnSpc>
+              <a:spcBef>
+                <a:spcPts val="0"/>
+              </a:spcBef>
+              <a:spcAft>
+                <a:spcPts val="0"/>
+              </a:spcAft>
+              <a:buClrTx/>
+              <a:buSzTx/>
+              <a:buFontTx/>
+              <a:buNone/>
+              <a:tabLst/>
+              <a:defRPr/>
+            </a:pPr>
+            <a:endParaRPr lang="en-US" baseline="0" dirty="0" smtClean="0"/>
+          </a:p>
+          <a:p>
             <a:r>
               <a:rPr lang="en-US" dirty="0" smtClean="0"/>
-              <a:t>Assertions are useful for avoiding informational</a:t>
+              <a:t>They’re useful for avoiding informational</a:t>
             </a:r>
             <a:r>
               <a:rPr lang="en-US" baseline="0" dirty="0" smtClean="0"/>
-              <a:t> leakage and catching problems before they go any further and become larger.  They declare that an assumption you’re making about the data must be true or the computer shouldn’t continue.</a:t>
+              <a:t> leakage in pipelines and catching problems before they go any further and become larger or harder to notice.  Physical leaks are similarly caught and fixed in oil, water, and gas pipelines by checking expected pressure at intervals.</a:t>
+            </a:r>
+          </a:p>
+          <a:p>
+            <a:endParaRPr lang="en-US" baseline="0" dirty="0" smtClean="0"/>
+          </a:p>
+          <a:p>
+            <a:r>
+              <a:rPr lang="en-US" baseline="0" dirty="0" smtClean="0"/>
+              <a:t>Assertions are relatively easy to add to </a:t>
+            </a:r>
+            <a:r>
+              <a:rPr lang="en-US" baseline="0" dirty="0" err="1" smtClean="0"/>
+              <a:t>Makefile</a:t>
+            </a:r>
+            <a:r>
+              <a:rPr lang="en-US" baseline="0" dirty="0" smtClean="0"/>
+              <a:t> recipes because if you cause an error make will abort processing.</a:t>
             </a:r>
           </a:p>
         </p:txBody>
@@ -1826,7 +1960,7 @@
           <a:p>
             <a:fld id="{F18F993B-D9A3-E546-AE3F-4D3986D8AE1D}" type="slidenum">
               <a:rPr lang="en-US" smtClean="0"/>
-              <a:t>20</a:t>
+              <a:t>21</a:t>
             </a:fld>
             <a:endParaRPr lang="en-US"/>
           </a:p>
@@ -2073,7 +2207,7 @@
           <a:p>
             <a:fld id="{F18F993B-D9A3-E546-AE3F-4D3986D8AE1D}" type="slidenum">
               <a:rPr lang="en-US" smtClean="0"/>
-              <a:t>21</a:t>
+              <a:t>23</a:t>
             </a:fld>
             <a:endParaRPr lang="en-US"/>
           </a:p>
@@ -2173,7 +2307,7 @@
           <a:p>
             <a:fld id="{F18F993B-D9A3-E546-AE3F-4D3986D8AE1D}" type="slidenum">
               <a:rPr lang="en-US" smtClean="0"/>
-              <a:t>23</a:t>
+              <a:t>24</a:t>
             </a:fld>
             <a:endParaRPr lang="en-US"/>
           </a:p>
@@ -2183,6 +2317,211 @@
     <p:extLst>
       <p:ext uri="{BB962C8B-B14F-4D97-AF65-F5344CB8AC3E}">
         <p14:creationId xmlns:p14="http://schemas.microsoft.com/office/powerpoint/2010/main" val="1357787156"/>
+      </p:ext>
+    </p:extLst>
+  </p:cSld>
+  <p:clrMapOvr>
+    <a:masterClrMapping/>
+  </p:clrMapOvr>
+</p:notes>
+</file>
+
+<file path=ppt/notesSlides/notesSlide22.xml><?xml version="1.0" encoding="utf-8"?>
+<p:notes xmlns:a="http://schemas.openxmlformats.org/drawingml/2006/main" xmlns:r="http://schemas.openxmlformats.org/officeDocument/2006/relationships" xmlns:p="http://schemas.openxmlformats.org/presentationml/2006/main">
+  <p:cSld>
+    <p:spTree>
+      <p:nvGrpSpPr>
+        <p:cNvPr id="1" name=""/>
+        <p:cNvGrpSpPr/>
+        <p:nvPr/>
+      </p:nvGrpSpPr>
+      <p:grpSpPr>
+        <a:xfrm>
+          <a:off x="0" y="0"/>
+          <a:ext cx="0" cy="0"/>
+          <a:chOff x="0" y="0"/>
+          <a:chExt cx="0" cy="0"/>
+        </a:xfrm>
+      </p:grpSpPr>
+      <p:sp>
+        <p:nvSpPr>
+          <p:cNvPr id="2" name="Slide Image Placeholder 1"/>
+          <p:cNvSpPr>
+            <a:spLocks noGrp="1" noRot="1" noChangeAspect="1"/>
+          </p:cNvSpPr>
+          <p:nvPr>
+            <p:ph type="sldImg"/>
+          </p:nvPr>
+        </p:nvSpPr>
+        <p:spPr/>
+      </p:sp>
+      <p:sp>
+        <p:nvSpPr>
+          <p:cNvPr id="3" name="Notes Placeholder 2"/>
+          <p:cNvSpPr>
+            <a:spLocks noGrp="1"/>
+          </p:cNvSpPr>
+          <p:nvPr>
+            <p:ph type="body" idx="1"/>
+          </p:nvPr>
+        </p:nvSpPr>
+        <p:spPr/>
+        <p:txBody>
+          <a:bodyPr/>
+          <a:lstStyle/>
+          <a:p>
+            <a:r>
+              <a:rPr lang="en-US" dirty="0" smtClean="0"/>
+              <a:t>make takes a -j or --jobs</a:t>
+            </a:r>
+            <a:r>
+              <a:rPr lang="en-US" baseline="0" dirty="0" smtClean="0"/>
+              <a:t> option which tells it how many jobs to run in parallel.  You shouldn’t set this more than the number of cores if the tasks are computationally intensive (generally the case for bioinformatics).  </a:t>
+            </a:r>
+            <a:r>
+              <a:rPr lang="en-US" baseline="0" dirty="0" err="1" smtClean="0"/>
+              <a:t>themis</a:t>
+            </a:r>
+            <a:r>
+              <a:rPr lang="en-US" baseline="0" dirty="0" smtClean="0"/>
+              <a:t> has 24 cores, your computer might have 1 or 2 or 4.  Other servers will have different numbers</a:t>
+            </a:r>
+            <a:r>
+              <a:rPr lang="en-US" baseline="0" dirty="0" smtClean="0"/>
+              <a:t>.</a:t>
+            </a:r>
+          </a:p>
+          <a:p>
+            <a:endParaRPr lang="en-US" baseline="0" dirty="0" smtClean="0"/>
+          </a:p>
+          <a:p>
+            <a:r>
+              <a:rPr lang="en-US" baseline="0" dirty="0" smtClean="0"/>
+              <a:t>parallel is a program which helps you run other programs in parallel.  It also has a -j option, but by default it will use as many jobs as the computer has cores.  Handy!</a:t>
+            </a:r>
+            <a:endParaRPr lang="en-US" dirty="0"/>
+          </a:p>
+        </p:txBody>
+      </p:sp>
+      <p:sp>
+        <p:nvSpPr>
+          <p:cNvPr id="4" name="Slide Number Placeholder 3"/>
+          <p:cNvSpPr>
+            <a:spLocks noGrp="1"/>
+          </p:cNvSpPr>
+          <p:nvPr>
+            <p:ph type="sldNum" sz="quarter" idx="10"/>
+          </p:nvPr>
+        </p:nvSpPr>
+        <p:spPr/>
+        <p:txBody>
+          <a:bodyPr/>
+          <a:lstStyle/>
+          <a:p>
+            <a:fld id="{F18F993B-D9A3-E546-AE3F-4D3986D8AE1D}" type="slidenum">
+              <a:rPr lang="en-US" smtClean="0"/>
+              <a:t>25</a:t>
+            </a:fld>
+            <a:endParaRPr lang="en-US"/>
+          </a:p>
+        </p:txBody>
+      </p:sp>
+    </p:spTree>
+    <p:extLst>
+      <p:ext uri="{BB962C8B-B14F-4D97-AF65-F5344CB8AC3E}">
+        <p14:creationId xmlns:p14="http://schemas.microsoft.com/office/powerpoint/2010/main" val="1861057480"/>
+      </p:ext>
+    </p:extLst>
+  </p:cSld>
+  <p:clrMapOvr>
+    <a:masterClrMapping/>
+  </p:clrMapOvr>
+</p:notes>
+</file>
+
+<file path=ppt/notesSlides/notesSlide23.xml><?xml version="1.0" encoding="utf-8"?>
+<p:notes xmlns:a="http://schemas.openxmlformats.org/drawingml/2006/main" xmlns:r="http://schemas.openxmlformats.org/officeDocument/2006/relationships" xmlns:p="http://schemas.openxmlformats.org/presentationml/2006/main">
+  <p:cSld>
+    <p:spTree>
+      <p:nvGrpSpPr>
+        <p:cNvPr id="1" name=""/>
+        <p:cNvGrpSpPr/>
+        <p:nvPr/>
+      </p:nvGrpSpPr>
+      <p:grpSpPr>
+        <a:xfrm>
+          <a:off x="0" y="0"/>
+          <a:ext cx="0" cy="0"/>
+          <a:chOff x="0" y="0"/>
+          <a:chExt cx="0" cy="0"/>
+        </a:xfrm>
+      </p:grpSpPr>
+      <p:sp>
+        <p:nvSpPr>
+          <p:cNvPr id="2" name="Slide Image Placeholder 1"/>
+          <p:cNvSpPr>
+            <a:spLocks noGrp="1" noRot="1" noChangeAspect="1"/>
+          </p:cNvSpPr>
+          <p:nvPr>
+            <p:ph type="sldImg"/>
+          </p:nvPr>
+        </p:nvSpPr>
+        <p:spPr/>
+      </p:sp>
+      <p:sp>
+        <p:nvSpPr>
+          <p:cNvPr id="3" name="Notes Placeholder 2"/>
+          <p:cNvSpPr>
+            <a:spLocks noGrp="1"/>
+          </p:cNvSpPr>
+          <p:nvPr>
+            <p:ph type="body" idx="1"/>
+          </p:nvPr>
+        </p:nvSpPr>
+        <p:spPr/>
+        <p:txBody>
+          <a:bodyPr/>
+          <a:lstStyle/>
+          <a:p>
+            <a:r>
+              <a:rPr lang="en-US" dirty="0" smtClean="0"/>
+              <a:t>You can check yourself</a:t>
+            </a:r>
+            <a:r>
+              <a:rPr lang="en-US" baseline="0" dirty="0" smtClean="0"/>
+              <a:t> how many a computer has, for Macs or Linux.</a:t>
+            </a:r>
+            <a:endParaRPr lang="en-US" dirty="0"/>
+          </a:p>
+        </p:txBody>
+      </p:sp>
+      <p:sp>
+        <p:nvSpPr>
+          <p:cNvPr id="4" name="Slide Number Placeholder 3"/>
+          <p:cNvSpPr>
+            <a:spLocks noGrp="1"/>
+          </p:cNvSpPr>
+          <p:nvPr>
+            <p:ph type="sldNum" sz="quarter" idx="10"/>
+          </p:nvPr>
+        </p:nvSpPr>
+        <p:spPr/>
+        <p:txBody>
+          <a:bodyPr/>
+          <a:lstStyle/>
+          <a:p>
+            <a:fld id="{F18F993B-D9A3-E546-AE3F-4D3986D8AE1D}" type="slidenum">
+              <a:rPr lang="en-US" smtClean="0"/>
+              <a:t>26</a:t>
+            </a:fld>
+            <a:endParaRPr lang="en-US"/>
+          </a:p>
+        </p:txBody>
+      </p:sp>
+    </p:spTree>
+    <p:extLst>
+      <p:ext uri="{BB962C8B-B14F-4D97-AF65-F5344CB8AC3E}">
+        <p14:creationId xmlns:p14="http://schemas.microsoft.com/office/powerpoint/2010/main" val="275358108"/>
       </p:ext>
     </p:extLst>
   </p:cSld>
@@ -2599,11 +2938,7 @@
           <a:p>
             <a:r>
               <a:rPr lang="en-US" baseline="0" dirty="0" smtClean="0"/>
-              <a:t>Recipes just describe what to run, the necessary prerequisites (or dependencies), and what files are produced.  You can run core Unix commands, your own Python, R, or Perl scripts, and use features of your shell to pipe data between commands</a:t>
-            </a:r>
-            <a:r>
-              <a:rPr lang="en-US" baseline="0" dirty="0" smtClean="0"/>
-              <a:t>.</a:t>
+              <a:t>Recipes just describe what to run, the necessary prerequisites (or dependencies), and what files are produced.  You can run core Unix commands, your own Python, R, or Perl scripts, and use features of your shell to pipe data between commands.</a:t>
             </a:r>
           </a:p>
           <a:p>
@@ -2622,7 +2957,6 @@
               <a:rPr lang="en-US" baseline="0" dirty="0" smtClean="0"/>
               <a:t>.  Best yet, make will figure this out for you and you don’t need to remember what’s changed.</a:t>
             </a:r>
-            <a:endParaRPr lang="en-US" baseline="0" dirty="0" smtClean="0"/>
           </a:p>
         </p:txBody>
       </p:sp>
@@ -2708,11 +3042,7 @@
           <a:p>
             <a:r>
               <a:rPr lang="en-US" baseline="0" dirty="0" smtClean="0"/>
-              <a:t>An </a:t>
-            </a:r>
-            <a:r>
-              <a:rPr lang="en-US" baseline="0" dirty="0" smtClean="0"/>
-              <a:t>example!</a:t>
+              <a:t>An example!</a:t>
             </a:r>
           </a:p>
           <a:p>
@@ -2843,7 +3173,6 @@
               <a:rPr lang="en-US" baseline="0" dirty="0" smtClean="0"/>
               <a:t>This is an equivalent recipe which save some typing.  It also provides you flexibility if you rename your targets or inputs later.  It’s especially useful for recipes which describe how to make multiple files, so I’ll use these variables from now on.  It’s a good practice.  Note that recipes can specify multiple targets or prerequisites and $&lt; and $@ are only the first of the files being made/input.  There are other variables to get all of them, which you’ll see later.</a:t>
             </a:r>
-            <a:endParaRPr lang="en-US" baseline="0" dirty="0" smtClean="0"/>
           </a:p>
         </p:txBody>
       </p:sp>
@@ -3285,7 +3614,7 @@
           <a:p>
             <a:fld id="{A925BE74-8160-3B49-8D0F-E557085791B4}" type="datetimeFigureOut">
               <a:rPr lang="en-US" smtClean="0"/>
-              <a:t>5/6/14</a:t>
+              <a:t>5/19/14</a:t>
             </a:fld>
             <a:endParaRPr lang="en-US"/>
           </a:p>
@@ -3455,7 +3784,7 @@
           <a:p>
             <a:fld id="{A925BE74-8160-3B49-8D0F-E557085791B4}" type="datetimeFigureOut">
               <a:rPr lang="en-US" smtClean="0"/>
-              <a:t>5/6/14</a:t>
+              <a:t>5/19/14</a:t>
             </a:fld>
             <a:endParaRPr lang="en-US"/>
           </a:p>
@@ -3635,7 +3964,7 @@
           <a:p>
             <a:fld id="{A925BE74-8160-3B49-8D0F-E557085791B4}" type="datetimeFigureOut">
               <a:rPr lang="en-US" smtClean="0"/>
-              <a:t>5/6/14</a:t>
+              <a:t>5/19/14</a:t>
             </a:fld>
             <a:endParaRPr lang="en-US"/>
           </a:p>
@@ -3805,7 +4134,7 @@
           <a:p>
             <a:fld id="{A925BE74-8160-3B49-8D0F-E557085791B4}" type="datetimeFigureOut">
               <a:rPr lang="en-US" smtClean="0"/>
-              <a:t>5/6/14</a:t>
+              <a:t>5/19/14</a:t>
             </a:fld>
             <a:endParaRPr lang="en-US"/>
           </a:p>
@@ -4051,7 +4380,7 @@
           <a:p>
             <a:fld id="{A925BE74-8160-3B49-8D0F-E557085791B4}" type="datetimeFigureOut">
               <a:rPr lang="en-US" smtClean="0"/>
-              <a:t>5/6/14</a:t>
+              <a:t>5/19/14</a:t>
             </a:fld>
             <a:endParaRPr lang="en-US"/>
           </a:p>
@@ -4339,7 +4668,7 @@
           <a:p>
             <a:fld id="{A925BE74-8160-3B49-8D0F-E557085791B4}" type="datetimeFigureOut">
               <a:rPr lang="en-US" smtClean="0"/>
-              <a:t>5/6/14</a:t>
+              <a:t>5/19/14</a:t>
             </a:fld>
             <a:endParaRPr lang="en-US"/>
           </a:p>
@@ -4761,7 +5090,7 @@
           <a:p>
             <a:fld id="{A925BE74-8160-3B49-8D0F-E557085791B4}" type="datetimeFigureOut">
               <a:rPr lang="en-US" smtClean="0"/>
-              <a:t>5/6/14</a:t>
+              <a:t>5/19/14</a:t>
             </a:fld>
             <a:endParaRPr lang="en-US"/>
           </a:p>
@@ -4879,7 +5208,7 @@
           <a:p>
             <a:fld id="{A925BE74-8160-3B49-8D0F-E557085791B4}" type="datetimeFigureOut">
               <a:rPr lang="en-US" smtClean="0"/>
-              <a:t>5/6/14</a:t>
+              <a:t>5/19/14</a:t>
             </a:fld>
             <a:endParaRPr lang="en-US"/>
           </a:p>
@@ -4974,7 +5303,7 @@
           <a:p>
             <a:fld id="{A925BE74-8160-3B49-8D0F-E557085791B4}" type="datetimeFigureOut">
               <a:rPr lang="en-US" smtClean="0"/>
-              <a:t>5/6/14</a:t>
+              <a:t>5/19/14</a:t>
             </a:fld>
             <a:endParaRPr lang="en-US"/>
           </a:p>
@@ -5251,7 +5580,7 @@
           <a:p>
             <a:fld id="{A925BE74-8160-3B49-8D0F-E557085791B4}" type="datetimeFigureOut">
               <a:rPr lang="en-US" smtClean="0"/>
-              <a:t>5/6/14</a:t>
+              <a:t>5/19/14</a:t>
             </a:fld>
             <a:endParaRPr lang="en-US"/>
           </a:p>
@@ -5504,7 +5833,7 @@
           <a:p>
             <a:fld id="{A925BE74-8160-3B49-8D0F-E557085791B4}" type="datetimeFigureOut">
               <a:rPr lang="en-US" smtClean="0"/>
-              <a:t>5/6/14</a:t>
+              <a:t>5/19/14</a:t>
             </a:fld>
             <a:endParaRPr lang="en-US"/>
           </a:p>
@@ -5717,7 +6046,7 @@
           <a:p>
             <a:fld id="{A925BE74-8160-3B49-8D0F-E557085791B4}" type="datetimeFigureOut">
               <a:rPr lang="en-US" smtClean="0"/>
-              <a:t>5/6/14</a:t>
+              <a:t>5/19/14</a:t>
             </a:fld>
             <a:endParaRPr lang="en-US"/>
           </a:p>
@@ -6147,15 +6476,7 @@
             <a:pPr algn="r"/>
             <a:r>
               <a:rPr lang="en-US" sz="1600" dirty="0" smtClean="0"/>
-              <a:t>Thomas Sibley – </a:t>
-            </a:r>
-            <a:r>
-              <a:rPr lang="en-US" sz="1600" dirty="0" smtClean="0"/>
-              <a:t>21 </a:t>
-            </a:r>
-            <a:r>
-              <a:rPr lang="en-US" sz="1600" dirty="0" smtClean="0"/>
-              <a:t>May 2014 – Mullins Comp Bio Group</a:t>
+              <a:t>Thomas Sibley – 21 May 2014 – Mullins Comp Bio Group</a:t>
             </a:r>
             <a:endParaRPr lang="en-US" sz="1600" dirty="0"/>
           </a:p>
@@ -6370,19 +6691,8 @@
                 <a:latin typeface="Consolas"/>
                 <a:cs typeface="Consolas"/>
               </a:rPr>
-              <a:t>       -frame </a:t>
-            </a:r>
-            <a:r>
-              <a:rPr lang="en-US" sz="2400" dirty="0" smtClean="0">
-                <a:latin typeface="Consolas"/>
-                <a:cs typeface="Consolas"/>
-              </a:rPr>
-              <a:t>1 -clean</a:t>
-            </a:r>
-            <a:endParaRPr lang="en-US" sz="2400" dirty="0" smtClean="0">
-              <a:latin typeface="Consolas"/>
-              <a:cs typeface="Consolas"/>
-            </a:endParaRPr>
+              <a:t>       -frame 1 -clean</a:t>
+            </a:r>
           </a:p>
           <a:p>
             <a:pPr marL="0" indent="0">
@@ -6448,14 +6758,7 @@
                 <a:latin typeface="Consolas"/>
                 <a:cs typeface="Consolas"/>
               </a:rPr>
-              <a:t>	</a:t>
-            </a:r>
-            <a:r>
-              <a:rPr lang="en-US" sz="2400" dirty="0">
-                <a:latin typeface="Consolas"/>
-                <a:cs typeface="Consolas"/>
-              </a:rPr>
-              <a:t>muscle -quiet </a:t>
+              <a:t>	muscle -quiet </a:t>
             </a:r>
             <a:r>
               <a:rPr lang="en-US" sz="2400" dirty="0">
@@ -6783,14 +7086,7 @@
                 <a:latin typeface="Consolas"/>
                 <a:cs typeface="Consolas"/>
               </a:rPr>
-              <a:t>0.25 </a:t>
-            </a:r>
-            <a:r>
-              <a:rPr lang="en-US" sz="2400" dirty="0" smtClean="0">
-                <a:latin typeface="Consolas"/>
-                <a:cs typeface="Consolas"/>
-              </a:rPr>
-              <a:t>0.5</a:t>
+              <a:t>0.25 0.5</a:t>
             </a:r>
           </a:p>
         </p:txBody>
@@ -7089,14 +7385,7 @@
                 <a:latin typeface="Consolas"/>
                 <a:cs typeface="Consolas"/>
               </a:rPr>
-              <a:t>	</a:t>
-            </a:r>
-            <a:r>
-              <a:rPr lang="en-US" sz="2400" dirty="0">
-                <a:latin typeface="Consolas"/>
-                <a:cs typeface="Consolas"/>
-              </a:rPr>
-              <a:t>muscle -quiet </a:t>
+              <a:t>	muscle -quiet </a:t>
             </a:r>
             <a:r>
               <a:rPr lang="en-US" sz="2400" dirty="0">
@@ -7338,14 +7627,7 @@
                 <a:latin typeface="Consolas"/>
                 <a:cs typeface="Consolas"/>
               </a:rPr>
-              <a:t>0.25 </a:t>
-            </a:r>
-            <a:r>
-              <a:rPr lang="en-US" sz="2400" dirty="0" smtClean="0">
-                <a:latin typeface="Consolas"/>
-                <a:cs typeface="Consolas"/>
-              </a:rPr>
-              <a:t>0.5</a:t>
+              <a:t>0.25 0.5</a:t>
             </a:r>
           </a:p>
         </p:txBody>
@@ -7669,14 +7951,7 @@
                 <a:latin typeface="Consolas"/>
                 <a:cs typeface="Consolas"/>
               </a:rPr>
-              <a:t>	</a:t>
-            </a:r>
-            <a:r>
-              <a:rPr lang="en-US" sz="2400" dirty="0">
-                <a:latin typeface="Consolas"/>
-                <a:cs typeface="Consolas"/>
-              </a:rPr>
-              <a:t>muscle -quiet </a:t>
+              <a:t>	muscle -quiet </a:t>
             </a:r>
             <a:r>
               <a:rPr lang="en-US" sz="2400" dirty="0">
@@ -7908,14 +8183,7 @@
                 <a:latin typeface="Consolas"/>
                 <a:cs typeface="Consolas"/>
               </a:rPr>
-              <a:t>0.25 </a:t>
-            </a:r>
-            <a:r>
-              <a:rPr lang="en-US" sz="2400" dirty="0" smtClean="0">
-                <a:latin typeface="Consolas"/>
-                <a:cs typeface="Consolas"/>
-              </a:rPr>
-              <a:t>0.5</a:t>
+              <a:t>0.25 0.5</a:t>
             </a:r>
           </a:p>
         </p:txBody>
@@ -8264,14 +8532,7 @@
                 <a:latin typeface="Consolas"/>
                 <a:cs typeface="Consolas"/>
               </a:rPr>
-              <a:t>	</a:t>
-            </a:r>
-            <a:r>
-              <a:rPr lang="en-US" sz="2400" dirty="0">
-                <a:latin typeface="Consolas"/>
-                <a:cs typeface="Consolas"/>
-              </a:rPr>
-              <a:t>muscle -quiet </a:t>
+              <a:t>	muscle -quiet </a:t>
             </a:r>
             <a:r>
               <a:rPr lang="en-US" sz="2400" dirty="0">
@@ -8503,14 +8764,7 @@
                 <a:latin typeface="Consolas"/>
                 <a:cs typeface="Consolas"/>
               </a:rPr>
-              <a:t>0.25 </a:t>
-            </a:r>
-            <a:r>
-              <a:rPr lang="en-US" sz="2400" dirty="0" smtClean="0">
-                <a:latin typeface="Consolas"/>
-                <a:cs typeface="Consolas"/>
-              </a:rPr>
-              <a:t>0.5</a:t>
+              <a:t>0.25 0.5</a:t>
             </a:r>
           </a:p>
         </p:txBody>
@@ -8756,19 +9010,8 @@
                 <a:latin typeface="Consolas"/>
                 <a:cs typeface="Consolas"/>
               </a:rPr>
-              <a:t>       -frame </a:t>
-            </a:r>
-            <a:r>
-              <a:rPr lang="en-US" sz="2400" dirty="0" smtClean="0">
-                <a:latin typeface="Consolas"/>
-                <a:cs typeface="Consolas"/>
-              </a:rPr>
-              <a:t>1 -clean</a:t>
-            </a:r>
-            <a:endParaRPr lang="en-US" sz="2400" dirty="0" smtClean="0">
-              <a:latin typeface="Consolas"/>
-              <a:cs typeface="Consolas"/>
-            </a:endParaRPr>
+              <a:t>       -frame 1 -clean</a:t>
+            </a:r>
           </a:p>
           <a:p>
             <a:pPr marL="0" indent="0">
@@ -8983,17 +9226,7 @@
                 <a:latin typeface="Consolas"/>
                 <a:cs typeface="Consolas"/>
               </a:rPr>
-              <a:t>%</a:t>
-            </a:r>
-            <a:r>
-              <a:rPr lang="en-US" sz="2400" dirty="0" smtClean="0">
-                <a:solidFill>
-                  <a:srgbClr val="558ED5"/>
-                </a:solidFill>
-                <a:latin typeface="Consolas"/>
-                <a:cs typeface="Consolas"/>
-              </a:rPr>
-              <a:t>_</a:t>
+              <a:t>%_</a:t>
             </a:r>
             <a:r>
               <a:rPr lang="en-US" sz="2400" dirty="0" err="1" smtClean="0">
@@ -9121,14 +9354,7 @@
                 <a:latin typeface="Consolas"/>
                 <a:cs typeface="Consolas"/>
               </a:rPr>
-              <a:t> </a:t>
-            </a:r>
-            <a:r>
-              <a:rPr lang="en-US" sz="2400" dirty="0" smtClean="0">
-                <a:latin typeface="Consolas"/>
-                <a:cs typeface="Consolas"/>
-              </a:rPr>
-              <a:t>0.25 0.5</a:t>
+              <a:t> 0.25 0.5</a:t>
             </a:r>
           </a:p>
         </p:txBody>
@@ -9441,19 +9667,8 @@
                 <a:latin typeface="Consolas"/>
                 <a:cs typeface="Consolas"/>
               </a:rPr>
-              <a:t>       -frame </a:t>
-            </a:r>
-            <a:r>
-              <a:rPr lang="en-US" sz="2400" dirty="0" smtClean="0">
-                <a:latin typeface="Consolas"/>
-                <a:cs typeface="Consolas"/>
-              </a:rPr>
-              <a:t>1 -clean</a:t>
-            </a:r>
-            <a:endParaRPr lang="en-US" sz="2400" dirty="0" smtClean="0">
-              <a:latin typeface="Consolas"/>
-              <a:cs typeface="Consolas"/>
-            </a:endParaRPr>
+              <a:t>       -frame 1 -clean</a:t>
+            </a:r>
           </a:p>
           <a:p>
             <a:pPr marL="0" indent="0">
@@ -9544,14 +9759,7 @@
                 <a:latin typeface="Consolas"/>
                 <a:cs typeface="Consolas"/>
               </a:rPr>
-              <a:t>	</a:t>
-            </a:r>
-            <a:r>
-              <a:rPr lang="en-US" sz="2400" dirty="0">
-                <a:latin typeface="Consolas"/>
-                <a:cs typeface="Consolas"/>
-              </a:rPr>
-              <a:t>muscle -quiet </a:t>
+              <a:t>	muscle -quiet </a:t>
             </a:r>
             <a:r>
               <a:rPr lang="en-US" sz="2400" dirty="0" smtClean="0">
@@ -9588,14 +9796,7 @@
                 <a:latin typeface="Consolas"/>
                 <a:cs typeface="Consolas"/>
               </a:rPr>
-              <a:t> </a:t>
-            </a:r>
-            <a:r>
-              <a:rPr lang="en-US" sz="2400" dirty="0" smtClean="0">
-                <a:latin typeface="Consolas"/>
-                <a:cs typeface="Consolas"/>
-              </a:rPr>
-              <a:t>fasta2nexus </a:t>
+              <a:t> fasta2nexus </a:t>
             </a:r>
             <a:r>
               <a:rPr lang="en-US" sz="2400" dirty="0" smtClean="0">
@@ -9739,17 +9940,7 @@
                 <a:latin typeface="Consolas"/>
                 <a:cs typeface="Consolas"/>
               </a:rPr>
-              <a:t>%</a:t>
-            </a:r>
-            <a:r>
-              <a:rPr lang="en-US" sz="2400" dirty="0" smtClean="0">
-                <a:solidFill>
-                  <a:srgbClr val="558ED5"/>
-                </a:solidFill>
-                <a:latin typeface="Consolas"/>
-                <a:cs typeface="Consolas"/>
-              </a:rPr>
-              <a:t>_</a:t>
+              <a:t>%_</a:t>
             </a:r>
             <a:r>
               <a:rPr lang="en-US" sz="2400" dirty="0" err="1" smtClean="0">
@@ -9887,14 +10078,7 @@
                 <a:latin typeface="Consolas"/>
                 <a:cs typeface="Consolas"/>
               </a:rPr>
-              <a:t> </a:t>
-            </a:r>
-            <a:r>
-              <a:rPr lang="en-US" sz="2400" dirty="0" smtClean="0">
-                <a:latin typeface="Consolas"/>
-                <a:cs typeface="Consolas"/>
-              </a:rPr>
-              <a:t>0.25 0.5</a:t>
+              <a:t> 0.25 0.5</a:t>
             </a:r>
           </a:p>
         </p:txBody>
@@ -10060,10 +10244,24 @@
                 <a:latin typeface="Consolas"/>
                 <a:cs typeface="Consolas"/>
               </a:rPr>
-              <a:t>	echo “Hi, my name is </a:t>
+              <a:t>	</a:t>
+            </a:r>
+            <a:r>
+              <a:rPr lang="en-US" dirty="0">
+                <a:latin typeface="Consolas"/>
+                <a:cs typeface="Consolas"/>
+              </a:rPr>
+              <a:t>echo </a:t>
             </a:r>
             <a:r>
               <a:rPr lang="en-US" dirty="0" smtClean="0">
+                <a:latin typeface="Consolas"/>
+                <a:cs typeface="Consolas"/>
+              </a:rPr>
+              <a:t>'Hi, my name is </a:t>
+            </a:r>
+            <a:r>
+              <a:rPr lang="en-US" dirty="0" smtClean="0">
                 <a:solidFill>
                   <a:srgbClr val="C0504D"/>
                 </a:solidFill>
@@ -10077,7 +10275,7 @@
                 <a:latin typeface="Consolas"/>
                 <a:cs typeface="Consolas"/>
               </a:rPr>
-              <a:t>.”</a:t>
+              <a:t>.'</a:t>
             </a:r>
           </a:p>
           <a:p>
@@ -10134,10 +10332,24 @@
                 <a:latin typeface="Consolas"/>
                 <a:cs typeface="Consolas"/>
               </a:rPr>
-              <a:t>	echo “Your balance is </a:t>
+              <a:t>	</a:t>
+            </a:r>
+            <a:r>
+              <a:rPr lang="en-US" sz="2800" dirty="0">
+                <a:latin typeface="Consolas"/>
+                <a:cs typeface="Consolas"/>
+              </a:rPr>
+              <a:t>echo </a:t>
             </a:r>
             <a:r>
               <a:rPr lang="en-US" sz="2800" dirty="0" smtClean="0">
+                <a:latin typeface="Consolas"/>
+                <a:cs typeface="Consolas"/>
+              </a:rPr>
+              <a:t>'Your balance is </a:t>
+            </a:r>
+            <a:r>
+              <a:rPr lang="en-US" sz="2800" dirty="0" smtClean="0">
                 <a:solidFill>
                   <a:srgbClr val="C0504D"/>
                 </a:solidFill>
@@ -10151,7 +10363,7 @@
                 <a:latin typeface="Consolas"/>
                 <a:cs typeface="Consolas"/>
               </a:rPr>
-              <a:t>17.03”</a:t>
+              <a:t>17.03.'</a:t>
             </a:r>
           </a:p>
           <a:p>
@@ -11161,7 +11373,7 @@
           <a:p>
             <a:r>
               <a:rPr lang="en-US" dirty="0" smtClean="0"/>
-              <a:t>Assertions</a:t>
+              <a:t>Validation</a:t>
             </a:r>
             <a:endParaRPr lang="en-US" dirty="0"/>
           </a:p>
@@ -11182,229 +11394,24 @@
           <a:bodyPr/>
           <a:lstStyle/>
           <a:p>
+            <a:r>
+              <a:rPr lang="en-US" dirty="0" smtClean="0"/>
+              <a:t>Charts in R</a:t>
+            </a:r>
             <a:endParaRPr lang="en-US" dirty="0"/>
-          </a:p>
-        </p:txBody>
-      </p:sp>
-      <p:sp>
-        <p:nvSpPr>
-          <p:cNvPr id="4" name="Subtitle 2"/>
-          <p:cNvSpPr txBox="1">
-            <a:spLocks/>
-          </p:cNvSpPr>
-          <p:nvPr/>
-        </p:nvSpPr>
-        <p:spPr>
-          <a:xfrm>
-            <a:off x="0" y="6475187"/>
-            <a:ext cx="9144000" cy="395514"/>
-          </a:xfrm>
-          <a:prstGeom prst="rect">
-            <a:avLst/>
-          </a:prstGeom>
-        </p:spPr>
-        <p:txBody>
-          <a:bodyPr vert="horz" lIns="91440" tIns="45720" rIns="91440" bIns="45720" rtlCol="0">
-            <a:normAutofit fontScale="85000" lnSpcReduction="10000"/>
-          </a:bodyPr>
-          <a:lstStyle>
-            <a:lvl1pPr marL="342900" indent="-342900" algn="l" defTabSz="457200" rtl="0" eaLnBrk="1" latinLnBrk="0" hangingPunct="1">
-              <a:spcBef>
-                <a:spcPct val="20000"/>
-              </a:spcBef>
-              <a:buFont typeface="Arial"/>
-              <a:buChar char="•"/>
-              <a:defRPr sz="3200" kern="1200">
-                <a:solidFill>
-                  <a:schemeClr val="tx1"/>
-                </a:solidFill>
-                <a:latin typeface="+mn-lt"/>
-                <a:ea typeface="+mn-ea"/>
-                <a:cs typeface="+mn-cs"/>
-              </a:defRPr>
-            </a:lvl1pPr>
-            <a:lvl2pPr marL="742950" indent="-285750" algn="l" defTabSz="457200" rtl="0" eaLnBrk="1" latinLnBrk="0" hangingPunct="1">
-              <a:spcBef>
-                <a:spcPct val="20000"/>
-              </a:spcBef>
-              <a:buFont typeface="Arial"/>
-              <a:buChar char="–"/>
-              <a:defRPr sz="2800" kern="1200">
-                <a:solidFill>
-                  <a:schemeClr val="tx1"/>
-                </a:solidFill>
-                <a:latin typeface="+mn-lt"/>
-                <a:ea typeface="+mn-ea"/>
-                <a:cs typeface="+mn-cs"/>
-              </a:defRPr>
-            </a:lvl2pPr>
-            <a:lvl3pPr marL="1143000" indent="-228600" algn="l" defTabSz="457200" rtl="0" eaLnBrk="1" latinLnBrk="0" hangingPunct="1">
-              <a:spcBef>
-                <a:spcPct val="20000"/>
-              </a:spcBef>
-              <a:buFont typeface="Arial"/>
-              <a:buChar char="•"/>
-              <a:defRPr sz="2400" kern="1200">
-                <a:solidFill>
-                  <a:schemeClr val="tx1"/>
-                </a:solidFill>
-                <a:latin typeface="+mn-lt"/>
-                <a:ea typeface="+mn-ea"/>
-                <a:cs typeface="+mn-cs"/>
-              </a:defRPr>
-            </a:lvl3pPr>
-            <a:lvl4pPr marL="1600200" indent="-228600" algn="l" defTabSz="457200" rtl="0" eaLnBrk="1" latinLnBrk="0" hangingPunct="1">
-              <a:spcBef>
-                <a:spcPct val="20000"/>
-              </a:spcBef>
-              <a:buFont typeface="Arial"/>
-              <a:buChar char="–"/>
-              <a:defRPr sz="2000" kern="1200">
-                <a:solidFill>
-                  <a:schemeClr val="tx1"/>
-                </a:solidFill>
-                <a:latin typeface="+mn-lt"/>
-                <a:ea typeface="+mn-ea"/>
-                <a:cs typeface="+mn-cs"/>
-              </a:defRPr>
-            </a:lvl4pPr>
-            <a:lvl5pPr marL="2057400" indent="-228600" algn="l" defTabSz="457200" rtl="0" eaLnBrk="1" latinLnBrk="0" hangingPunct="1">
-              <a:spcBef>
-                <a:spcPct val="20000"/>
-              </a:spcBef>
-              <a:buFont typeface="Arial"/>
-              <a:buChar char="»"/>
-              <a:defRPr sz="2000" kern="1200">
-                <a:solidFill>
-                  <a:schemeClr val="tx1"/>
-                </a:solidFill>
-                <a:latin typeface="+mn-lt"/>
-                <a:ea typeface="+mn-ea"/>
-                <a:cs typeface="+mn-cs"/>
-              </a:defRPr>
-            </a:lvl5pPr>
-            <a:lvl6pPr marL="2514600" indent="-228600" algn="l" defTabSz="457200" rtl="0" eaLnBrk="1" latinLnBrk="0" hangingPunct="1">
-              <a:spcBef>
-                <a:spcPct val="20000"/>
-              </a:spcBef>
-              <a:buFont typeface="Arial"/>
-              <a:buChar char="•"/>
-              <a:defRPr sz="2000" kern="1200">
-                <a:solidFill>
-                  <a:schemeClr val="tx1"/>
-                </a:solidFill>
-                <a:latin typeface="+mn-lt"/>
-                <a:ea typeface="+mn-ea"/>
-                <a:cs typeface="+mn-cs"/>
-              </a:defRPr>
-            </a:lvl6pPr>
-            <a:lvl7pPr marL="2971800" indent="-228600" algn="l" defTabSz="457200" rtl="0" eaLnBrk="1" latinLnBrk="0" hangingPunct="1">
-              <a:spcBef>
-                <a:spcPct val="20000"/>
-              </a:spcBef>
-              <a:buFont typeface="Arial"/>
-              <a:buChar char="•"/>
-              <a:defRPr sz="2000" kern="1200">
-                <a:solidFill>
-                  <a:schemeClr val="tx1"/>
-                </a:solidFill>
-                <a:latin typeface="+mn-lt"/>
-                <a:ea typeface="+mn-ea"/>
-                <a:cs typeface="+mn-cs"/>
-              </a:defRPr>
-            </a:lvl7pPr>
-            <a:lvl8pPr marL="3429000" indent="-228600" algn="l" defTabSz="457200" rtl="0" eaLnBrk="1" latinLnBrk="0" hangingPunct="1">
-              <a:spcBef>
-                <a:spcPct val="20000"/>
-              </a:spcBef>
-              <a:buFont typeface="Arial"/>
-              <a:buChar char="•"/>
-              <a:defRPr sz="2000" kern="1200">
-                <a:solidFill>
-                  <a:schemeClr val="tx1"/>
-                </a:solidFill>
-                <a:latin typeface="+mn-lt"/>
-                <a:ea typeface="+mn-ea"/>
-                <a:cs typeface="+mn-cs"/>
-              </a:defRPr>
-            </a:lvl8pPr>
-            <a:lvl9pPr marL="3886200" indent="-228600" algn="l" defTabSz="457200" rtl="0" eaLnBrk="1" latinLnBrk="0" hangingPunct="1">
-              <a:spcBef>
-                <a:spcPct val="20000"/>
-              </a:spcBef>
-              <a:buFont typeface="Arial"/>
-              <a:buChar char="•"/>
-              <a:defRPr sz="2000" kern="1200">
-                <a:solidFill>
-                  <a:schemeClr val="tx1"/>
-                </a:solidFill>
-                <a:latin typeface="+mn-lt"/>
-                <a:ea typeface="+mn-ea"/>
-                <a:cs typeface="+mn-cs"/>
-              </a:defRPr>
-            </a:lvl9pPr>
-          </a:lstStyle>
-          <a:p>
-            <a:pPr marL="0" indent="0" algn="r">
-              <a:buNone/>
-            </a:pPr>
-            <a:r>
-              <a:rPr lang="en-US" sz="1600" dirty="0" smtClean="0">
-                <a:solidFill>
-                  <a:schemeClr val="bg1">
-                    <a:lumMod val="50000"/>
-                  </a:schemeClr>
-                </a:solidFill>
-              </a:rPr>
-              <a:t>http://</a:t>
-            </a:r>
-            <a:r>
-              <a:rPr lang="en-US" sz="1600" dirty="0" err="1" smtClean="0">
-                <a:solidFill>
-                  <a:schemeClr val="bg1">
-                    <a:lumMod val="50000"/>
-                  </a:schemeClr>
-                </a:solidFill>
-              </a:rPr>
-              <a:t>vincebuffalo.org</a:t>
-            </a:r>
-            <a:r>
-              <a:rPr lang="en-US" sz="1600" dirty="0" smtClean="0">
-                <a:solidFill>
-                  <a:schemeClr val="bg1">
-                    <a:lumMod val="50000"/>
-                  </a:schemeClr>
-                </a:solidFill>
-              </a:rPr>
-              <a:t>/2012/03/08/the-beauty-of-bioconductor.html#information_leakage_and_statistics_at_every_level</a:t>
-            </a:r>
-            <a:endParaRPr lang="en-US" sz="1600" dirty="0">
-              <a:solidFill>
-                <a:schemeClr val="bg1">
-                  <a:lumMod val="50000"/>
-                </a:schemeClr>
-              </a:solidFill>
-            </a:endParaRPr>
           </a:p>
         </p:txBody>
       </p:sp>
     </p:spTree>
     <p:extLst>
       <p:ext uri="{BB962C8B-B14F-4D97-AF65-F5344CB8AC3E}">
-        <p14:creationId xmlns:p14="http://schemas.microsoft.com/office/powerpoint/2010/main" val="2796108273"/>
+        <p14:creationId xmlns:p14="http://schemas.microsoft.com/office/powerpoint/2010/main" val="1893170104"/>
       </p:ext>
     </p:extLst>
   </p:cSld>
   <p:clrMapOvr>
     <a:masterClrMapping/>
   </p:clrMapOvr>
-  <p:timing>
-    <p:tnLst>
-      <p:par>
-        <p:cTn xmlns:p14="http://schemas.microsoft.com/office/powerpoint/2010/main" id="1" dur="indefinite" restart="never" nodeType="tmRoot"/>
-      </p:par>
-    </p:tnLst>
-  </p:timing>
 </p:sld>
 </file>
 
@@ -11441,15 +11448,8 @@
           <a:lstStyle/>
           <a:p>
             <a:r>
-              <a:rPr lang="en-US" dirty="0" err="1" smtClean="0">
-                <a:latin typeface="Consolas"/>
-                <a:cs typeface="Consolas"/>
-              </a:rPr>
-              <a:t>Makefile</a:t>
-            </a:r>
-            <a:r>
               <a:rPr lang="en-US" dirty="0" smtClean="0"/>
-              <a:t> gotchas</a:t>
+              <a:t>Assertions</a:t>
             </a:r>
             <a:endParaRPr lang="en-US" dirty="0"/>
           </a:p>
@@ -11467,146 +11467,244 @@
         </p:nvSpPr>
         <p:spPr/>
         <p:txBody>
-          <a:bodyPr>
+          <a:bodyPr/>
+          <a:lstStyle/>
+          <a:p>
+            <a:r>
+              <a:rPr lang="en-US" dirty="0" smtClean="0"/>
+              <a:t>State assumptions</a:t>
+            </a:r>
+          </a:p>
+          <a:p>
+            <a:r>
+              <a:rPr lang="en-US" dirty="0" smtClean="0"/>
+              <a:t>Error if assumption doesn’t hold</a:t>
+            </a:r>
+          </a:p>
+          <a:p>
+            <a:r>
+              <a:rPr lang="en-US" dirty="0" smtClean="0"/>
+              <a:t>Catch problems with data earlier than later</a:t>
+            </a:r>
+          </a:p>
+          <a:p>
+            <a:r>
+              <a:rPr lang="en-US" dirty="0" smtClean="0"/>
+              <a:t>Avoid “information leakage”*</a:t>
+            </a:r>
+          </a:p>
+          <a:p>
+            <a:endParaRPr lang="en-US" dirty="0"/>
+          </a:p>
+          <a:p>
+            <a:r>
+              <a:rPr lang="en-US" dirty="0" smtClean="0"/>
+              <a:t>Assertions are an old programming tool</a:t>
+            </a:r>
+          </a:p>
+          <a:p>
+            <a:endParaRPr lang="en-US" dirty="0"/>
+          </a:p>
+        </p:txBody>
+      </p:sp>
+      <p:sp>
+        <p:nvSpPr>
+          <p:cNvPr id="4" name="Subtitle 2"/>
+          <p:cNvSpPr txBox="1">
+            <a:spLocks/>
+          </p:cNvSpPr>
+          <p:nvPr/>
+        </p:nvSpPr>
+        <p:spPr>
+          <a:xfrm>
+            <a:off x="0" y="6475187"/>
+            <a:ext cx="9144000" cy="395514"/>
+          </a:xfrm>
+          <a:prstGeom prst="rect">
+            <a:avLst/>
+          </a:prstGeom>
+        </p:spPr>
+        <p:txBody>
+          <a:bodyPr vert="horz" lIns="91440" tIns="45720" rIns="91440" bIns="45720" rtlCol="0">
             <a:normAutofit/>
           </a:bodyPr>
-          <a:lstStyle/>
-          <a:p>
-            <a:r>
-              <a:rPr lang="en-US" dirty="0" smtClean="0">
-                <a:cs typeface="Calibri"/>
-              </a:rPr>
-              <a:t>Hard tabs vs. spaces</a:t>
-            </a:r>
-          </a:p>
-          <a:p>
-            <a:r>
-              <a:rPr lang="en-US" dirty="0" smtClean="0">
-                <a:cs typeface="Calibri"/>
-              </a:rPr>
-              <a:t>Force updates after changing </a:t>
-            </a:r>
-            <a:r>
-              <a:rPr lang="en-US" dirty="0" err="1" smtClean="0">
-                <a:latin typeface="Consolas"/>
-                <a:cs typeface="Consolas"/>
-              </a:rPr>
-              <a:t>Makefile</a:t>
-            </a:r>
-            <a:endParaRPr lang="en-US" dirty="0" smtClean="0">
-              <a:cs typeface="Calibri"/>
-            </a:endParaRPr>
-          </a:p>
-          <a:p>
-            <a:r>
-              <a:rPr lang="en-US" dirty="0" smtClean="0">
-                <a:cs typeface="Calibri"/>
-              </a:rPr>
-              <a:t>Change default behavior on error:</a:t>
-            </a:r>
-          </a:p>
-          <a:p>
-            <a:endParaRPr lang="en-US" dirty="0">
-              <a:latin typeface="Consolas"/>
-              <a:cs typeface="Consolas"/>
-            </a:endParaRPr>
-          </a:p>
-          <a:p>
-            <a:pPr marL="0" indent="0">
+          <a:lstStyle>
+            <a:lvl1pPr marL="342900" indent="-342900" algn="l" defTabSz="457200" rtl="0" eaLnBrk="1" latinLnBrk="0" hangingPunct="1">
+              <a:spcBef>
+                <a:spcPct val="20000"/>
+              </a:spcBef>
+              <a:buFont typeface="Arial"/>
+              <a:buChar char="•"/>
+              <a:defRPr sz="3200" kern="1200">
+                <a:solidFill>
+                  <a:schemeClr val="tx1"/>
+                </a:solidFill>
+                <a:latin typeface="+mn-lt"/>
+                <a:ea typeface="+mn-ea"/>
+                <a:cs typeface="+mn-cs"/>
+              </a:defRPr>
+            </a:lvl1pPr>
+            <a:lvl2pPr marL="742950" indent="-285750" algn="l" defTabSz="457200" rtl="0" eaLnBrk="1" latinLnBrk="0" hangingPunct="1">
+              <a:spcBef>
+                <a:spcPct val="20000"/>
+              </a:spcBef>
+              <a:buFont typeface="Arial"/>
+              <a:buChar char="–"/>
+              <a:defRPr sz="2800" kern="1200">
+                <a:solidFill>
+                  <a:schemeClr val="tx1"/>
+                </a:solidFill>
+                <a:latin typeface="+mn-lt"/>
+                <a:ea typeface="+mn-ea"/>
+                <a:cs typeface="+mn-cs"/>
+              </a:defRPr>
+            </a:lvl2pPr>
+            <a:lvl3pPr marL="1143000" indent="-228600" algn="l" defTabSz="457200" rtl="0" eaLnBrk="1" latinLnBrk="0" hangingPunct="1">
+              <a:spcBef>
+                <a:spcPct val="20000"/>
+              </a:spcBef>
+              <a:buFont typeface="Arial"/>
+              <a:buChar char="•"/>
+              <a:defRPr sz="2400" kern="1200">
+                <a:solidFill>
+                  <a:schemeClr val="tx1"/>
+                </a:solidFill>
+                <a:latin typeface="+mn-lt"/>
+                <a:ea typeface="+mn-ea"/>
+                <a:cs typeface="+mn-cs"/>
+              </a:defRPr>
+            </a:lvl3pPr>
+            <a:lvl4pPr marL="1600200" indent="-228600" algn="l" defTabSz="457200" rtl="0" eaLnBrk="1" latinLnBrk="0" hangingPunct="1">
+              <a:spcBef>
+                <a:spcPct val="20000"/>
+              </a:spcBef>
+              <a:buFont typeface="Arial"/>
+              <a:buChar char="–"/>
+              <a:defRPr sz="2000" kern="1200">
+                <a:solidFill>
+                  <a:schemeClr val="tx1"/>
+                </a:solidFill>
+                <a:latin typeface="+mn-lt"/>
+                <a:ea typeface="+mn-ea"/>
+                <a:cs typeface="+mn-cs"/>
+              </a:defRPr>
+            </a:lvl4pPr>
+            <a:lvl5pPr marL="2057400" indent="-228600" algn="l" defTabSz="457200" rtl="0" eaLnBrk="1" latinLnBrk="0" hangingPunct="1">
+              <a:spcBef>
+                <a:spcPct val="20000"/>
+              </a:spcBef>
+              <a:buFont typeface="Arial"/>
+              <a:buChar char="»"/>
+              <a:defRPr sz="2000" kern="1200">
+                <a:solidFill>
+                  <a:schemeClr val="tx1"/>
+                </a:solidFill>
+                <a:latin typeface="+mn-lt"/>
+                <a:ea typeface="+mn-ea"/>
+                <a:cs typeface="+mn-cs"/>
+              </a:defRPr>
+            </a:lvl5pPr>
+            <a:lvl6pPr marL="2514600" indent="-228600" algn="l" defTabSz="457200" rtl="0" eaLnBrk="1" latinLnBrk="0" hangingPunct="1">
+              <a:spcBef>
+                <a:spcPct val="20000"/>
+              </a:spcBef>
+              <a:buFont typeface="Arial"/>
+              <a:buChar char="•"/>
+              <a:defRPr sz="2000" kern="1200">
+                <a:solidFill>
+                  <a:schemeClr val="tx1"/>
+                </a:solidFill>
+                <a:latin typeface="+mn-lt"/>
+                <a:ea typeface="+mn-ea"/>
+                <a:cs typeface="+mn-cs"/>
+              </a:defRPr>
+            </a:lvl6pPr>
+            <a:lvl7pPr marL="2971800" indent="-228600" algn="l" defTabSz="457200" rtl="0" eaLnBrk="1" latinLnBrk="0" hangingPunct="1">
+              <a:spcBef>
+                <a:spcPct val="20000"/>
+              </a:spcBef>
+              <a:buFont typeface="Arial"/>
+              <a:buChar char="•"/>
+              <a:defRPr sz="2000" kern="1200">
+                <a:solidFill>
+                  <a:schemeClr val="tx1"/>
+                </a:solidFill>
+                <a:latin typeface="+mn-lt"/>
+                <a:ea typeface="+mn-ea"/>
+                <a:cs typeface="+mn-cs"/>
+              </a:defRPr>
+            </a:lvl7pPr>
+            <a:lvl8pPr marL="3429000" indent="-228600" algn="l" defTabSz="457200" rtl="0" eaLnBrk="1" latinLnBrk="0" hangingPunct="1">
+              <a:spcBef>
+                <a:spcPct val="20000"/>
+              </a:spcBef>
+              <a:buFont typeface="Arial"/>
+              <a:buChar char="•"/>
+              <a:defRPr sz="2000" kern="1200">
+                <a:solidFill>
+                  <a:schemeClr val="tx1"/>
+                </a:solidFill>
+                <a:latin typeface="+mn-lt"/>
+                <a:ea typeface="+mn-ea"/>
+                <a:cs typeface="+mn-cs"/>
+              </a:defRPr>
+            </a:lvl8pPr>
+            <a:lvl9pPr marL="3886200" indent="-228600" algn="l" defTabSz="457200" rtl="0" eaLnBrk="1" latinLnBrk="0" hangingPunct="1">
+              <a:spcBef>
+                <a:spcPct val="20000"/>
+              </a:spcBef>
+              <a:buFont typeface="Arial"/>
+              <a:buChar char="•"/>
+              <a:defRPr sz="2000" kern="1200">
+                <a:solidFill>
+                  <a:schemeClr val="tx1"/>
+                </a:solidFill>
+                <a:latin typeface="+mn-lt"/>
+                <a:ea typeface="+mn-ea"/>
+                <a:cs typeface="+mn-cs"/>
+              </a:defRPr>
+            </a:lvl9pPr>
+          </a:lstStyle>
+          <a:p>
+            <a:pPr marL="0" indent="0" algn="r">
               <a:buNone/>
             </a:pPr>
             <a:r>
-              <a:rPr lang="en-US" dirty="0" smtClean="0">
-                <a:solidFill>
-                  <a:srgbClr val="C0504D"/>
-                </a:solidFill>
-                <a:latin typeface="Consolas"/>
-                <a:cs typeface="Consolas"/>
-              </a:rPr>
-              <a:t>SHELL</a:t>
-            </a:r>
-            <a:r>
-              <a:rPr lang="en-US" dirty="0" smtClean="0">
-                <a:latin typeface="Consolas"/>
-                <a:cs typeface="Consolas"/>
-              </a:rPr>
-              <a:t> := /</a:t>
-            </a:r>
-            <a:r>
-              <a:rPr lang="en-US" dirty="0" smtClean="0">
-                <a:latin typeface="Consolas"/>
-                <a:cs typeface="Consolas"/>
-              </a:rPr>
-              <a:t>bin/bash</a:t>
-            </a:r>
-          </a:p>
-          <a:p>
-            <a:pPr marL="0" indent="0">
-              <a:buNone/>
-            </a:pPr>
-            <a:r>
-              <a:rPr lang="en-US" dirty="0" smtClean="0">
-                <a:latin typeface="Consolas"/>
-                <a:cs typeface="Consolas"/>
-              </a:rPr>
-              <a:t>export </a:t>
-            </a:r>
-            <a:r>
-              <a:rPr lang="en-US" dirty="0" smtClean="0">
-                <a:solidFill>
-                  <a:srgbClr val="C0504D"/>
-                </a:solidFill>
-                <a:latin typeface="Consolas"/>
-                <a:cs typeface="Consolas"/>
-              </a:rPr>
-              <a:t>SHELLOPTS</a:t>
-            </a:r>
-            <a:r>
-              <a:rPr lang="en-US" dirty="0" smtClean="0">
-                <a:latin typeface="Consolas"/>
-                <a:cs typeface="Consolas"/>
-              </a:rPr>
-              <a:t> := </a:t>
-            </a:r>
-            <a:r>
-              <a:rPr lang="en-US" dirty="0" err="1" smtClean="0">
-                <a:latin typeface="Consolas"/>
-                <a:cs typeface="Consolas"/>
-              </a:rPr>
-              <a:t>errexit:pipefail</a:t>
-            </a:r>
-            <a:endParaRPr lang="en-US" dirty="0" smtClean="0">
-              <a:latin typeface="Consolas"/>
-              <a:cs typeface="Consolas"/>
-            </a:endParaRPr>
-          </a:p>
-          <a:p>
-            <a:pPr marL="0" indent="0">
-              <a:buNone/>
-            </a:pPr>
-            <a:r>
-              <a:rPr lang="en-US" dirty="0" smtClean="0">
-                <a:solidFill>
-                  <a:schemeClr val="tx2">
-                    <a:lumMod val="60000"/>
-                    <a:lumOff val="40000"/>
+              <a:rPr lang="en-US" sz="1390" dirty="0" smtClean="0">
+                <a:solidFill>
+                  <a:schemeClr val="bg1">
+                    <a:lumMod val="50000"/>
                   </a:schemeClr>
                 </a:solidFill>
-                <a:latin typeface="Consolas"/>
-                <a:cs typeface="Consolas"/>
-              </a:rPr>
-              <a:t>.DELETE_ON_ERROR</a:t>
-            </a:r>
-            <a:r>
-              <a:rPr lang="en-US" dirty="0" smtClean="0">
-                <a:latin typeface="Consolas"/>
-                <a:cs typeface="Consolas"/>
-              </a:rPr>
-              <a:t>:</a:t>
-            </a:r>
-            <a:endParaRPr lang="en-US" dirty="0">
-              <a:latin typeface="Consolas"/>
-              <a:cs typeface="Consolas"/>
+              </a:rPr>
+              <a:t>* http://</a:t>
+            </a:r>
+            <a:r>
+              <a:rPr lang="en-US" sz="1390" dirty="0" err="1" smtClean="0">
+                <a:solidFill>
+                  <a:schemeClr val="bg1">
+                    <a:lumMod val="50000"/>
+                  </a:schemeClr>
+                </a:solidFill>
+              </a:rPr>
+              <a:t>vincebuffalo.org</a:t>
+            </a:r>
+            <a:r>
+              <a:rPr lang="en-US" sz="1390" dirty="0" smtClean="0">
+                <a:solidFill>
+                  <a:schemeClr val="bg1">
+                    <a:lumMod val="50000"/>
+                  </a:schemeClr>
+                </a:solidFill>
+              </a:rPr>
+              <a:t>/2012/03/08/the-beauty-of-bioconductor.html#information_leakage_and_statistics_at_every_level</a:t>
+            </a:r>
+            <a:endParaRPr lang="en-US" sz="1390" dirty="0">
+              <a:solidFill>
+                <a:schemeClr val="bg1">
+                  <a:lumMod val="50000"/>
+                </a:schemeClr>
+              </a:solidFill>
             </a:endParaRPr>
           </a:p>
         </p:txBody>
@@ -11614,7 +11712,7 @@
     </p:spTree>
     <p:extLst>
       <p:ext uri="{BB962C8B-B14F-4D97-AF65-F5344CB8AC3E}">
-        <p14:creationId xmlns:p14="http://schemas.microsoft.com/office/powerpoint/2010/main" val="3735696"/>
+        <p14:creationId xmlns:p14="http://schemas.microsoft.com/office/powerpoint/2010/main" val="2796108273"/>
       </p:ext>
     </p:extLst>
   </p:cSld>
@@ -11665,7 +11763,7 @@
           <a:p>
             <a:r>
               <a:rPr lang="en-US" dirty="0" smtClean="0"/>
-              <a:t>Parallelize!</a:t>
+              <a:t>Assertions</a:t>
             </a:r>
             <a:endParaRPr lang="en-US" dirty="0"/>
           </a:p>
@@ -11681,67 +11779,285 @@
             <p:ph idx="1"/>
           </p:nvPr>
         </p:nvSpPr>
-        <p:spPr/>
-        <p:txBody>
-          <a:bodyPr/>
+        <p:spPr>
+          <a:xfrm>
+            <a:off x="457200" y="1600200"/>
+            <a:ext cx="8686800" cy="4525963"/>
+          </a:xfrm>
+        </p:spPr>
+        <p:txBody>
+          <a:bodyPr>
+            <a:normAutofit/>
+          </a:bodyPr>
           <a:lstStyle/>
           <a:p>
-            <a:r>
-              <a:rPr lang="en-US" dirty="0" smtClean="0">
-                <a:latin typeface="Consolas"/>
-                <a:cs typeface="Consolas"/>
-              </a:rPr>
-              <a:t>make –j 24</a:t>
-            </a:r>
-          </a:p>
-          <a:p>
-            <a:r>
-              <a:rPr lang="en-US" dirty="0" smtClean="0">
-                <a:latin typeface="Consolas"/>
-                <a:cs typeface="Consolas"/>
-              </a:rPr>
-              <a:t>parallel</a:t>
-            </a:r>
-          </a:p>
-          <a:p>
-            <a:r>
-              <a:rPr lang="en-US" dirty="0" err="1" smtClean="0">
-                <a:latin typeface="Consolas"/>
-                <a:cs typeface="Consolas"/>
-              </a:rPr>
-              <a:t>xargs</a:t>
-            </a:r>
-            <a:r>
-              <a:rPr lang="en-US" dirty="0" smtClean="0">
-                <a:latin typeface="Consolas"/>
-                <a:cs typeface="Consolas"/>
-              </a:rPr>
-              <a:t> –P 24</a:t>
-            </a:r>
-            <a:endParaRPr lang="en-US" dirty="0">
-              <a:latin typeface="Consolas"/>
-              <a:cs typeface="Consolas"/>
-            </a:endParaRPr>
+            <a:pPr marL="0" indent="0">
+              <a:buNone/>
+            </a:pPr>
+            <a:r>
+              <a:rPr lang="en-US" sz="2800" dirty="0" smtClean="0">
+                <a:solidFill>
+                  <a:schemeClr val="tx2">
+                    <a:lumMod val="60000"/>
+                    <a:lumOff val="40000"/>
+                  </a:schemeClr>
+                </a:solidFill>
+                <a:latin typeface="Consolas"/>
+                <a:cs typeface="Consolas"/>
+              </a:rPr>
+              <a:t>HVTN505.renamed.fa</a:t>
+            </a:r>
+            <a:r>
+              <a:rPr lang="en-US" sz="2800" dirty="0" smtClean="0">
+                <a:latin typeface="Consolas"/>
+                <a:cs typeface="Consolas"/>
+              </a:rPr>
+              <a:t>: </a:t>
+            </a:r>
+            <a:r>
+              <a:rPr lang="en-US" sz="2800" dirty="0" smtClean="0">
+                <a:solidFill>
+                  <a:srgbClr val="77933C"/>
+                </a:solidFill>
+                <a:latin typeface="Consolas"/>
+                <a:cs typeface="Consolas"/>
+              </a:rPr>
+              <a:t>HVTN505.fa</a:t>
+            </a:r>
+          </a:p>
+          <a:p>
+            <a:pPr marL="0" indent="0">
+              <a:buNone/>
+            </a:pPr>
+            <a:r>
+              <a:rPr lang="en-US" sz="2800" dirty="0" smtClean="0">
+                <a:latin typeface="Consolas"/>
+                <a:cs typeface="Consolas"/>
+              </a:rPr>
+              <a:t>	rename-</a:t>
+            </a:r>
+            <a:r>
+              <a:rPr lang="en-US" sz="2800" dirty="0" err="1" smtClean="0">
+                <a:latin typeface="Consolas"/>
+                <a:cs typeface="Consolas"/>
+              </a:rPr>
+              <a:t>seqs</a:t>
+            </a:r>
+            <a:r>
+              <a:rPr lang="en-US" sz="2800" dirty="0" smtClean="0">
+                <a:latin typeface="Consolas"/>
+                <a:cs typeface="Consolas"/>
+              </a:rPr>
+              <a:t> </a:t>
+            </a:r>
+            <a:r>
+              <a:rPr lang="en-US" sz="2800" dirty="0" smtClean="0">
+                <a:solidFill>
+                  <a:schemeClr val="accent6">
+                    <a:lumMod val="75000"/>
+                  </a:schemeClr>
+                </a:solidFill>
+                <a:latin typeface="Consolas"/>
+                <a:cs typeface="Consolas"/>
+              </a:rPr>
+              <a:t>&lt;</a:t>
+            </a:r>
+            <a:r>
+              <a:rPr lang="en-US" sz="2800" dirty="0" smtClean="0">
+                <a:latin typeface="Consolas"/>
+                <a:cs typeface="Consolas"/>
+              </a:rPr>
+              <a:t> </a:t>
+            </a:r>
+            <a:r>
+              <a:rPr lang="en-US" sz="2800" dirty="0" smtClean="0">
+                <a:solidFill>
+                  <a:srgbClr val="77933C"/>
+                </a:solidFill>
+                <a:latin typeface="Consolas"/>
+                <a:cs typeface="Consolas"/>
+              </a:rPr>
+              <a:t>$&lt;</a:t>
+            </a:r>
+            <a:r>
+              <a:rPr lang="en-US" sz="2800" dirty="0" smtClean="0">
+                <a:latin typeface="Consolas"/>
+                <a:cs typeface="Consolas"/>
+              </a:rPr>
+              <a:t> </a:t>
+            </a:r>
+            <a:r>
+              <a:rPr lang="en-US" sz="2800" dirty="0" smtClean="0">
+                <a:solidFill>
+                  <a:srgbClr val="E46C0A"/>
+                </a:solidFill>
+                <a:latin typeface="Consolas"/>
+                <a:cs typeface="Consolas"/>
+              </a:rPr>
+              <a:t>&gt;</a:t>
+            </a:r>
+            <a:r>
+              <a:rPr lang="en-US" sz="2800" dirty="0" smtClean="0">
+                <a:latin typeface="Consolas"/>
+                <a:cs typeface="Consolas"/>
+              </a:rPr>
+              <a:t> </a:t>
+            </a:r>
+            <a:r>
+              <a:rPr lang="en-US" sz="2800" dirty="0" smtClean="0">
+                <a:solidFill>
+                  <a:srgbClr val="558ED5"/>
+                </a:solidFill>
+                <a:latin typeface="Consolas"/>
+                <a:cs typeface="Consolas"/>
+              </a:rPr>
+              <a:t>$@</a:t>
+            </a:r>
+          </a:p>
+          <a:p>
+            <a:pPr marL="0" indent="0">
+              <a:buNone/>
+            </a:pPr>
+            <a:r>
+              <a:rPr lang="en-US" sz="2800" dirty="0">
+                <a:latin typeface="Consolas"/>
+                <a:cs typeface="Consolas"/>
+              </a:rPr>
+              <a:t>	</a:t>
+            </a:r>
+            <a:r>
+              <a:rPr lang="en-US" sz="2800" dirty="0" smtClean="0">
+                <a:solidFill>
+                  <a:schemeClr val="accent6">
+                    <a:lumMod val="75000"/>
+                  </a:schemeClr>
+                </a:solidFill>
+                <a:latin typeface="Consolas"/>
+                <a:cs typeface="Consolas"/>
+              </a:rPr>
+              <a:t>[</a:t>
+            </a:r>
+            <a:r>
+              <a:rPr lang="en-US" sz="2800" dirty="0" smtClean="0">
+                <a:latin typeface="Consolas"/>
+                <a:cs typeface="Consolas"/>
+              </a:rPr>
+              <a:t> -z `</a:t>
+            </a:r>
+            <a:r>
+              <a:rPr lang="en-US" sz="2800" dirty="0" err="1" smtClean="0">
+                <a:latin typeface="Consolas"/>
+                <a:cs typeface="Consolas"/>
+              </a:rPr>
+              <a:t>grep</a:t>
+            </a:r>
+            <a:r>
+              <a:rPr lang="en-US" sz="2800" dirty="0" smtClean="0">
+                <a:latin typeface="Consolas"/>
+                <a:cs typeface="Consolas"/>
+              </a:rPr>
+              <a:t> '^&gt;' </a:t>
+            </a:r>
+            <a:r>
+              <a:rPr lang="en-US" sz="2800" dirty="0" smtClean="0">
+                <a:solidFill>
+                  <a:srgbClr val="558ED5"/>
+                </a:solidFill>
+                <a:latin typeface="Consolas"/>
+                <a:cs typeface="Consolas"/>
+              </a:rPr>
+              <a:t>$@</a:t>
+            </a:r>
+            <a:r>
+              <a:rPr lang="en-US" sz="2800" dirty="0" smtClean="0">
+                <a:latin typeface="Consolas"/>
+                <a:cs typeface="Consolas"/>
+              </a:rPr>
+              <a:t> </a:t>
+            </a:r>
+            <a:r>
+              <a:rPr lang="en-US" sz="2800" dirty="0" smtClean="0">
+                <a:solidFill>
+                  <a:srgbClr val="E46C0A"/>
+                </a:solidFill>
+                <a:latin typeface="Consolas"/>
+                <a:cs typeface="Consolas"/>
+              </a:rPr>
+              <a:t>|</a:t>
+            </a:r>
+            <a:r>
+              <a:rPr lang="en-US" sz="2800" dirty="0" smtClean="0">
+                <a:latin typeface="Consolas"/>
+                <a:cs typeface="Consolas"/>
+              </a:rPr>
+              <a:t> </a:t>
+            </a:r>
+            <a:r>
+              <a:rPr lang="en-US" sz="2800" dirty="0" err="1" smtClean="0">
+                <a:latin typeface="Consolas"/>
+                <a:cs typeface="Consolas"/>
+              </a:rPr>
+              <a:t>grep</a:t>
+            </a:r>
+            <a:r>
+              <a:rPr lang="en-US" sz="2800" dirty="0" smtClean="0">
+                <a:latin typeface="Consolas"/>
+                <a:cs typeface="Consolas"/>
+              </a:rPr>
+              <a:t> -E --invert </a:t>
+            </a:r>
+            <a:r>
+              <a:rPr lang="en-US" sz="2800" dirty="0" smtClean="0">
+                <a:solidFill>
+                  <a:srgbClr val="E46C0A"/>
+                </a:solidFill>
+                <a:latin typeface="Consolas"/>
+                <a:cs typeface="Consolas"/>
+              </a:rPr>
+              <a:t>\</a:t>
+            </a:r>
+          </a:p>
+          <a:p>
+            <a:pPr marL="0" indent="0">
+              <a:buNone/>
+            </a:pPr>
+            <a:r>
+              <a:rPr lang="en-US" sz="2800" dirty="0">
+                <a:latin typeface="Consolas"/>
+                <a:cs typeface="Consolas"/>
+              </a:rPr>
+              <a:t>	</a:t>
+            </a:r>
+            <a:r>
+              <a:rPr lang="en-US" sz="2800" dirty="0" smtClean="0">
+                <a:latin typeface="Consolas"/>
+                <a:cs typeface="Consolas"/>
+              </a:rPr>
+              <a:t>		'^&gt;505\.\d{4}a_(WG|RH|LH)\d{2}'` </a:t>
+            </a:r>
+            <a:r>
+              <a:rPr lang="en-US" sz="2800" dirty="0" smtClean="0">
+                <a:solidFill>
+                  <a:srgbClr val="E46C0A"/>
+                </a:solidFill>
+                <a:latin typeface="Consolas"/>
+                <a:cs typeface="Consolas"/>
+              </a:rPr>
+              <a:t>]</a:t>
+            </a:r>
           </a:p>
         </p:txBody>
       </p:sp>
     </p:spTree>
     <p:extLst>
       <p:ext uri="{BB962C8B-B14F-4D97-AF65-F5344CB8AC3E}">
-        <p14:creationId xmlns:p14="http://schemas.microsoft.com/office/powerpoint/2010/main" val="3645005559"/>
+        <p14:creationId xmlns:p14="http://schemas.microsoft.com/office/powerpoint/2010/main" val="1652581726"/>
       </p:ext>
     </p:extLst>
   </p:cSld>
   <p:clrMapOvr>
     <a:masterClrMapping/>
   </p:clrMapOvr>
-  <p:timing>
-    <p:tnLst>
-      <p:par>
-        <p:cTn xmlns:p14="http://schemas.microsoft.com/office/powerpoint/2010/main" id="1" dur="indefinite" restart="never" nodeType="tmRoot"/>
-      </p:par>
-    </p:tnLst>
-  </p:timing>
 </p:sld>
 </file>
 
@@ -11778,8 +12094,15 @@
           <a:lstStyle/>
           <a:p>
             <a:r>
+              <a:rPr lang="en-US" dirty="0" err="1" smtClean="0">
+                <a:latin typeface="Consolas"/>
+                <a:cs typeface="Consolas"/>
+              </a:rPr>
+              <a:t>Makefile</a:t>
+            </a:r>
+            <a:r>
               <a:rPr lang="en-US" dirty="0" smtClean="0"/>
-              <a:t>What can be parallelized?</a:t>
+              <a:t> gotchas</a:t>
             </a:r>
             <a:endParaRPr lang="en-US" dirty="0"/>
           </a:p>
@@ -11797,17 +12120,147 @@
         </p:nvSpPr>
         <p:spPr/>
         <p:txBody>
-          <a:bodyPr/>
+          <a:bodyPr>
+            <a:normAutofit/>
+          </a:bodyPr>
           <a:lstStyle/>
           <a:p>
-            <a:endParaRPr lang="en-US" dirty="0"/>
+            <a:r>
+              <a:rPr lang="en-US" dirty="0" smtClean="0">
+                <a:cs typeface="Calibri"/>
+              </a:rPr>
+              <a:t>Hard tabs vs. spaces</a:t>
+            </a:r>
+          </a:p>
+          <a:p>
+            <a:r>
+              <a:rPr lang="en-US" dirty="0" smtClean="0">
+                <a:cs typeface="Calibri"/>
+              </a:rPr>
+              <a:t>Force updates after changing </a:t>
+            </a:r>
+            <a:r>
+              <a:rPr lang="en-US" dirty="0" err="1" smtClean="0">
+                <a:latin typeface="Consolas"/>
+                <a:cs typeface="Consolas"/>
+              </a:rPr>
+              <a:t>Makefile</a:t>
+            </a:r>
+            <a:endParaRPr lang="en-US" dirty="0" smtClean="0">
+              <a:cs typeface="Calibri"/>
+            </a:endParaRPr>
+          </a:p>
+          <a:p>
+            <a:r>
+              <a:rPr lang="en-US" dirty="0" smtClean="0">
+                <a:cs typeface="Calibri"/>
+              </a:rPr>
+              <a:t>Change default behavior on error:</a:t>
+            </a:r>
+          </a:p>
+          <a:p>
+            <a:endParaRPr lang="en-US" dirty="0">
+              <a:latin typeface="Consolas"/>
+              <a:cs typeface="Consolas"/>
+            </a:endParaRPr>
+          </a:p>
+          <a:p>
+            <a:pPr marL="0" indent="0">
+              <a:buNone/>
+            </a:pPr>
+            <a:r>
+              <a:rPr lang="en-US" dirty="0" smtClean="0">
+                <a:solidFill>
+                  <a:srgbClr val="C0504D"/>
+                </a:solidFill>
+                <a:latin typeface="Consolas"/>
+                <a:cs typeface="Consolas"/>
+              </a:rPr>
+              <a:t>SHELL</a:t>
+            </a:r>
+            <a:r>
+              <a:rPr lang="en-US" dirty="0" smtClean="0">
+                <a:latin typeface="Consolas"/>
+                <a:cs typeface="Consolas"/>
+              </a:rPr>
+              <a:t> := /bin/bash</a:t>
+            </a:r>
+          </a:p>
+          <a:p>
+            <a:pPr marL="0" indent="0">
+              <a:buNone/>
+            </a:pPr>
+            <a:r>
+              <a:rPr lang="en-US" dirty="0" smtClean="0">
+                <a:latin typeface="Consolas"/>
+                <a:cs typeface="Consolas"/>
+              </a:rPr>
+              <a:t>export </a:t>
+            </a:r>
+            <a:r>
+              <a:rPr lang="en-US" dirty="0" smtClean="0">
+                <a:solidFill>
+                  <a:srgbClr val="C0504D"/>
+                </a:solidFill>
+                <a:latin typeface="Consolas"/>
+                <a:cs typeface="Consolas"/>
+              </a:rPr>
+              <a:t>SHELLOPTS</a:t>
+            </a:r>
+            <a:r>
+              <a:rPr lang="en-US" dirty="0" smtClean="0">
+                <a:latin typeface="Consolas"/>
+                <a:cs typeface="Consolas"/>
+              </a:rPr>
+              <a:t> := </a:t>
+            </a:r>
+            <a:r>
+              <a:rPr lang="en-US" dirty="0" err="1" smtClean="0">
+                <a:latin typeface="Consolas"/>
+                <a:cs typeface="Consolas"/>
+              </a:rPr>
+              <a:t>errexit:pipefail</a:t>
+            </a:r>
+            <a:endParaRPr lang="en-US" dirty="0" smtClean="0">
+              <a:latin typeface="Consolas"/>
+              <a:cs typeface="Consolas"/>
+            </a:endParaRPr>
+          </a:p>
+          <a:p>
+            <a:pPr marL="0" indent="0">
+              <a:buNone/>
+            </a:pPr>
+            <a:r>
+              <a:rPr lang="en-US" dirty="0" smtClean="0">
+                <a:solidFill>
+                  <a:schemeClr val="tx2">
+                    <a:lumMod val="60000"/>
+                    <a:lumOff val="40000"/>
+                  </a:schemeClr>
+                </a:solidFill>
+                <a:latin typeface="Consolas"/>
+                <a:cs typeface="Consolas"/>
+              </a:rPr>
+              <a:t>.DELETE_ON_ERROR</a:t>
+            </a:r>
+            <a:r>
+              <a:rPr lang="en-US" dirty="0" smtClean="0">
+                <a:latin typeface="Consolas"/>
+                <a:cs typeface="Consolas"/>
+              </a:rPr>
+              <a:t>:</a:t>
+            </a:r>
+            <a:endParaRPr lang="en-US" dirty="0">
+              <a:latin typeface="Consolas"/>
+              <a:cs typeface="Consolas"/>
+            </a:endParaRPr>
           </a:p>
         </p:txBody>
       </p:sp>
     </p:spTree>
     <p:extLst>
       <p:ext uri="{BB962C8B-B14F-4D97-AF65-F5344CB8AC3E}">
-        <p14:creationId xmlns:p14="http://schemas.microsoft.com/office/powerpoint/2010/main" val="1785806931"/>
+        <p14:creationId xmlns:p14="http://schemas.microsoft.com/office/powerpoint/2010/main" val="3735696"/>
       </p:ext>
     </p:extLst>
   </p:cSld>
@@ -11858,6 +12311,466 @@
           <a:p>
             <a:r>
               <a:rPr lang="en-US" dirty="0" smtClean="0"/>
+              <a:t>What can be parallelized?</a:t>
+            </a:r>
+            <a:endParaRPr lang="en-US" dirty="0"/>
+          </a:p>
+        </p:txBody>
+      </p:sp>
+      <p:sp>
+        <p:nvSpPr>
+          <p:cNvPr id="3" name="Content Placeholder 2"/>
+          <p:cNvSpPr>
+            <a:spLocks noGrp="1"/>
+          </p:cNvSpPr>
+          <p:nvPr>
+            <p:ph idx="1"/>
+          </p:nvPr>
+        </p:nvSpPr>
+        <p:spPr/>
+        <p:txBody>
+          <a:bodyPr/>
+          <a:lstStyle/>
+          <a:p>
+            <a:r>
+              <a:rPr lang="en-US" dirty="0" smtClean="0"/>
+              <a:t>Independent tasks</a:t>
+            </a:r>
+          </a:p>
+          <a:p>
+            <a:r>
+              <a:rPr lang="en-US" dirty="0" smtClean="0"/>
+              <a:t>All prerequisites available</a:t>
+            </a:r>
+          </a:p>
+          <a:p>
+            <a:endParaRPr lang="en-US" dirty="0"/>
+          </a:p>
+        </p:txBody>
+      </p:sp>
+    </p:spTree>
+    <p:extLst>
+      <p:ext uri="{BB962C8B-B14F-4D97-AF65-F5344CB8AC3E}">
+        <p14:creationId xmlns:p14="http://schemas.microsoft.com/office/powerpoint/2010/main" val="1785806931"/>
+      </p:ext>
+    </p:extLst>
+  </p:cSld>
+  <p:clrMapOvr>
+    <a:masterClrMapping/>
+  </p:clrMapOvr>
+  <p:timing>
+    <p:tnLst>
+      <p:par>
+        <p:cTn xmlns:p14="http://schemas.microsoft.com/office/powerpoint/2010/main" id="1" dur="indefinite" restart="never" nodeType="tmRoot"/>
+      </p:par>
+    </p:tnLst>
+  </p:timing>
+</p:sld>
+</file>
+
+<file path=ppt/slides/slide25.xml><?xml version="1.0" encoding="utf-8"?>
+<p:sld xmlns:a="http://schemas.openxmlformats.org/drawingml/2006/main" xmlns:r="http://schemas.openxmlformats.org/officeDocument/2006/relationships" xmlns:p="http://schemas.openxmlformats.org/presentationml/2006/main">
+  <p:cSld>
+    <p:spTree>
+      <p:nvGrpSpPr>
+        <p:cNvPr id="1" name=""/>
+        <p:cNvGrpSpPr/>
+        <p:nvPr/>
+      </p:nvGrpSpPr>
+      <p:grpSpPr>
+        <a:xfrm>
+          <a:off x="0" y="0"/>
+          <a:ext cx="0" cy="0"/>
+          <a:chOff x="0" y="0"/>
+          <a:chExt cx="0" cy="0"/>
+        </a:xfrm>
+      </p:grpSpPr>
+      <p:sp>
+        <p:nvSpPr>
+          <p:cNvPr id="2" name="Title 1"/>
+          <p:cNvSpPr>
+            <a:spLocks noGrp="1"/>
+          </p:cNvSpPr>
+          <p:nvPr>
+            <p:ph type="title"/>
+          </p:nvPr>
+        </p:nvSpPr>
+        <p:spPr/>
+        <p:txBody>
+          <a:bodyPr/>
+          <a:lstStyle/>
+          <a:p>
+            <a:r>
+              <a:rPr lang="en-US" dirty="0" smtClean="0"/>
+              <a:t>Parallelize!</a:t>
+            </a:r>
+            <a:endParaRPr lang="en-US" dirty="0"/>
+          </a:p>
+        </p:txBody>
+      </p:sp>
+      <p:sp>
+        <p:nvSpPr>
+          <p:cNvPr id="3" name="Content Placeholder 2"/>
+          <p:cNvSpPr>
+            <a:spLocks noGrp="1"/>
+          </p:cNvSpPr>
+          <p:nvPr>
+            <p:ph idx="1"/>
+          </p:nvPr>
+        </p:nvSpPr>
+        <p:spPr/>
+        <p:txBody>
+          <a:bodyPr/>
+          <a:lstStyle/>
+          <a:p>
+            <a:r>
+              <a:rPr lang="en-US" dirty="0" smtClean="0">
+                <a:latin typeface="Consolas"/>
+                <a:cs typeface="Consolas"/>
+              </a:rPr>
+              <a:t>make -j </a:t>
+            </a:r>
+            <a:r>
+              <a:rPr lang="en-US" dirty="0" smtClean="0">
+                <a:latin typeface="Consolas"/>
+                <a:cs typeface="Consolas"/>
+              </a:rPr>
+              <a:t>24</a:t>
+            </a:r>
+          </a:p>
+          <a:p>
+            <a:r>
+              <a:rPr lang="en-US" dirty="0" smtClean="0">
+                <a:latin typeface="Consolas"/>
+                <a:cs typeface="Consolas"/>
+              </a:rPr>
+              <a:t>parallel </a:t>
+            </a:r>
+            <a:endParaRPr lang="en-US" dirty="0" smtClean="0">
+              <a:latin typeface="Consolas"/>
+              <a:cs typeface="Consolas"/>
+            </a:endParaRPr>
+          </a:p>
+          <a:p>
+            <a:endParaRPr lang="en-US" dirty="0">
+              <a:latin typeface="Consolas"/>
+              <a:cs typeface="Consolas"/>
+            </a:endParaRPr>
+          </a:p>
+        </p:txBody>
+      </p:sp>
+    </p:spTree>
+    <p:extLst>
+      <p:ext uri="{BB962C8B-B14F-4D97-AF65-F5344CB8AC3E}">
+        <p14:creationId xmlns:p14="http://schemas.microsoft.com/office/powerpoint/2010/main" val="3645005559"/>
+      </p:ext>
+    </p:extLst>
+  </p:cSld>
+  <p:clrMapOvr>
+    <a:masterClrMapping/>
+  </p:clrMapOvr>
+  <p:timing>
+    <p:tnLst>
+      <p:par>
+        <p:cTn xmlns:p14="http://schemas.microsoft.com/office/powerpoint/2010/main" id="1" dur="indefinite" restart="never" nodeType="tmRoot"/>
+      </p:par>
+    </p:tnLst>
+  </p:timing>
+</p:sld>
+</file>
+
+<file path=ppt/slides/slide26.xml><?xml version="1.0" encoding="utf-8"?>
+<p:sld xmlns:a="http://schemas.openxmlformats.org/drawingml/2006/main" xmlns:r="http://schemas.openxmlformats.org/officeDocument/2006/relationships" xmlns:p="http://schemas.openxmlformats.org/presentationml/2006/main">
+  <p:cSld>
+    <p:spTree>
+      <p:nvGrpSpPr>
+        <p:cNvPr id="1" name=""/>
+        <p:cNvGrpSpPr/>
+        <p:nvPr/>
+      </p:nvGrpSpPr>
+      <p:grpSpPr>
+        <a:xfrm>
+          <a:off x="0" y="0"/>
+          <a:ext cx="0" cy="0"/>
+          <a:chOff x="0" y="0"/>
+          <a:chExt cx="0" cy="0"/>
+        </a:xfrm>
+      </p:grpSpPr>
+      <p:sp>
+        <p:nvSpPr>
+          <p:cNvPr id="2" name="Title 1"/>
+          <p:cNvSpPr>
+            <a:spLocks noGrp="1"/>
+          </p:cNvSpPr>
+          <p:nvPr>
+            <p:ph type="title"/>
+          </p:nvPr>
+        </p:nvSpPr>
+        <p:spPr/>
+        <p:txBody>
+          <a:bodyPr/>
+          <a:lstStyle/>
+          <a:p>
+            <a:r>
+              <a:rPr lang="en-US" dirty="0" smtClean="0"/>
+              <a:t>How many cores?</a:t>
+            </a:r>
+            <a:endParaRPr lang="en-US" dirty="0"/>
+          </a:p>
+        </p:txBody>
+      </p:sp>
+      <p:sp>
+        <p:nvSpPr>
+          <p:cNvPr id="3" name="Content Placeholder 2"/>
+          <p:cNvSpPr>
+            <a:spLocks noGrp="1"/>
+          </p:cNvSpPr>
+          <p:nvPr>
+            <p:ph idx="1"/>
+          </p:nvPr>
+        </p:nvSpPr>
+        <p:spPr>
+          <a:xfrm>
+            <a:off x="457200" y="1600200"/>
+            <a:ext cx="8229600" cy="5257800"/>
+          </a:xfrm>
+        </p:spPr>
+        <p:txBody>
+          <a:bodyPr>
+            <a:normAutofit/>
+          </a:bodyPr>
+          <a:lstStyle/>
+          <a:p>
+            <a:r>
+              <a:rPr lang="en-US" dirty="0" smtClean="0">
+                <a:cs typeface="Consolas"/>
+              </a:rPr>
+              <a:t>Apple menu </a:t>
+            </a:r>
+            <a:r>
+              <a:rPr lang="en-US" dirty="0">
+                <a:cs typeface="Consolas"/>
+              </a:rPr>
+              <a:t>→</a:t>
+            </a:r>
+            <a:r>
+              <a:rPr lang="en-US" dirty="0" smtClean="0">
+                <a:cs typeface="Consolas"/>
+              </a:rPr>
+              <a:t> About </a:t>
+            </a:r>
+            <a:r>
+              <a:rPr lang="en-US" dirty="0">
+                <a:cs typeface="Consolas"/>
+              </a:rPr>
+              <a:t>This Mac → More Info → System Report → </a:t>
+            </a:r>
+            <a:r>
+              <a:rPr lang="en-US" dirty="0" smtClean="0">
+                <a:cs typeface="Consolas"/>
+              </a:rPr>
+              <a:t>“Total </a:t>
+            </a:r>
+            <a:r>
+              <a:rPr lang="en-US" dirty="0">
+                <a:cs typeface="Consolas"/>
+              </a:rPr>
+              <a:t>number of </a:t>
+            </a:r>
+            <a:r>
+              <a:rPr lang="en-US" dirty="0" smtClean="0">
+                <a:cs typeface="Consolas"/>
+              </a:rPr>
+              <a:t>cores”</a:t>
+            </a:r>
+          </a:p>
+          <a:p>
+            <a:endParaRPr lang="en-US" dirty="0" smtClean="0">
+              <a:cs typeface="Consolas"/>
+            </a:endParaRPr>
+          </a:p>
+          <a:p>
+            <a:endParaRPr lang="en-US" dirty="0" smtClean="0">
+              <a:cs typeface="Consolas"/>
+            </a:endParaRPr>
+          </a:p>
+          <a:p>
+            <a:endParaRPr lang="en-US" dirty="0">
+              <a:latin typeface="Consolas"/>
+              <a:cs typeface="Consolas"/>
+            </a:endParaRPr>
+          </a:p>
+          <a:p>
+            <a:pPr marL="0" indent="0">
+              <a:buNone/>
+            </a:pPr>
+            <a:r>
+              <a:rPr lang="en-US" dirty="0" smtClean="0">
+                <a:latin typeface="Consolas"/>
+                <a:cs typeface="Consolas"/>
+              </a:rPr>
+              <a:t>$ </a:t>
+            </a:r>
+            <a:r>
+              <a:rPr lang="en-US" dirty="0" err="1" smtClean="0">
+                <a:latin typeface="Consolas"/>
+                <a:cs typeface="Consolas"/>
+              </a:rPr>
+              <a:t>lscpu</a:t>
+            </a:r>
+            <a:r>
+              <a:rPr lang="en-US" dirty="0" smtClean="0">
+                <a:latin typeface="Consolas"/>
+                <a:cs typeface="Consolas"/>
+              </a:rPr>
+              <a:t> | </a:t>
+            </a:r>
+            <a:r>
+              <a:rPr lang="en-US" dirty="0" err="1" smtClean="0">
+                <a:latin typeface="Consolas"/>
+                <a:cs typeface="Consolas"/>
+              </a:rPr>
+              <a:t>grep</a:t>
+            </a:r>
+            <a:r>
+              <a:rPr lang="en-US" dirty="0" smtClean="0">
+                <a:latin typeface="Consolas"/>
+                <a:cs typeface="Consolas"/>
+              </a:rPr>
+              <a:t> -E '</a:t>
+            </a:r>
+            <a:r>
+              <a:rPr lang="en-US" dirty="0" err="1" smtClean="0">
+                <a:latin typeface="Consolas"/>
+                <a:cs typeface="Consolas"/>
+              </a:rPr>
+              <a:t>Core|Socket</a:t>
+            </a:r>
+            <a:r>
+              <a:rPr lang="en-US" dirty="0" smtClean="0">
+                <a:latin typeface="Consolas"/>
+                <a:cs typeface="Consolas"/>
+              </a:rPr>
+              <a:t>'</a:t>
+            </a:r>
+          </a:p>
+          <a:p>
+            <a:pPr marL="0" indent="0">
+              <a:buNone/>
+            </a:pPr>
+            <a:r>
+              <a:rPr lang="sv-SE" dirty="0" err="1">
+                <a:latin typeface="Consolas"/>
+                <a:cs typeface="Consolas"/>
+              </a:rPr>
+              <a:t>Core</a:t>
+            </a:r>
+            <a:r>
+              <a:rPr lang="sv-SE" dirty="0">
+                <a:latin typeface="Consolas"/>
+                <a:cs typeface="Consolas"/>
+              </a:rPr>
+              <a:t>(s) per socket:    12</a:t>
+            </a:r>
+          </a:p>
+          <a:p>
+            <a:pPr marL="0" indent="0">
+              <a:buNone/>
+            </a:pPr>
+            <a:r>
+              <a:rPr lang="sv-SE" dirty="0">
+                <a:latin typeface="Consolas"/>
+                <a:cs typeface="Consolas"/>
+              </a:rPr>
+              <a:t>Socket(s):             2</a:t>
+            </a:r>
+            <a:endParaRPr lang="en-US" dirty="0" smtClean="0">
+              <a:latin typeface="Consolas"/>
+              <a:cs typeface="Consolas"/>
+            </a:endParaRPr>
+          </a:p>
+          <a:p>
+            <a:endParaRPr lang="en-US" dirty="0"/>
+          </a:p>
+        </p:txBody>
+      </p:sp>
+      <p:pic>
+        <p:nvPicPr>
+          <p:cNvPr id="4" name="Picture 3" descr="Screen_Shot_2014-05-19_at_17_02_22.png"/>
+          <p:cNvPicPr>
+            <a:picLocks noChangeAspect="1"/>
+          </p:cNvPicPr>
+          <p:nvPr/>
+        </p:nvPicPr>
+        <p:blipFill>
+          <a:blip r:embed="rId3">
+            <a:extLst>
+              <a:ext uri="{28A0092B-C50C-407E-A947-70E740481C1C}">
+                <a14:useLocalDpi xmlns:a14="http://schemas.microsoft.com/office/drawing/2010/main" val="0"/>
+              </a:ext>
+            </a:extLst>
+          </a:blip>
+          <a:stretch>
+            <a:fillRect/>
+          </a:stretch>
+        </p:blipFill>
+        <p:spPr>
+          <a:xfrm>
+            <a:off x="2851256" y="2848162"/>
+            <a:ext cx="3441489" cy="1203397"/>
+          </a:xfrm>
+          <a:prstGeom prst="rect">
+            <a:avLst/>
+          </a:prstGeom>
+        </p:spPr>
+      </p:pic>
+    </p:spTree>
+    <p:extLst>
+      <p:ext uri="{BB962C8B-B14F-4D97-AF65-F5344CB8AC3E}">
+        <p14:creationId xmlns:p14="http://schemas.microsoft.com/office/powerpoint/2010/main" val="3423089497"/>
+      </p:ext>
+    </p:extLst>
+  </p:cSld>
+  <p:clrMapOvr>
+    <a:masterClrMapping/>
+  </p:clrMapOvr>
+</p:sld>
+</file>
+
+<file path=ppt/slides/slide27.xml><?xml version="1.0" encoding="utf-8"?>
+<p:sld xmlns:a="http://schemas.openxmlformats.org/drawingml/2006/main" xmlns:r="http://schemas.openxmlformats.org/officeDocument/2006/relationships" xmlns:p="http://schemas.openxmlformats.org/presentationml/2006/main">
+  <p:cSld>
+    <p:spTree>
+      <p:nvGrpSpPr>
+        <p:cNvPr id="1" name=""/>
+        <p:cNvGrpSpPr/>
+        <p:nvPr/>
+      </p:nvGrpSpPr>
+      <p:grpSpPr>
+        <a:xfrm>
+          <a:off x="0" y="0"/>
+          <a:ext cx="0" cy="0"/>
+          <a:chOff x="0" y="0"/>
+          <a:chExt cx="0" cy="0"/>
+        </a:xfrm>
+      </p:grpSpPr>
+      <p:sp>
+        <p:nvSpPr>
+          <p:cNvPr id="2" name="Title 1"/>
+          <p:cNvSpPr>
+            <a:spLocks noGrp="1"/>
+          </p:cNvSpPr>
+          <p:nvPr>
+            <p:ph type="title"/>
+          </p:nvPr>
+        </p:nvSpPr>
+        <p:spPr/>
+        <p:txBody>
+          <a:bodyPr/>
+          <a:lstStyle/>
+          <a:p>
+            <a:r>
+              <a:rPr lang="en-US" dirty="0" smtClean="0"/>
               <a:t>Parallel NCBI BLAST+</a:t>
             </a:r>
             <a:endParaRPr lang="en-US" dirty="0"/>
@@ -11900,6 +12813,149 @@
       </p:par>
     </p:tnLst>
   </p:timing>
+</p:sld>
+</file>
+
+<file path=ppt/slides/slide28.xml><?xml version="1.0" encoding="utf-8"?>
+<p:sld xmlns:a="http://schemas.openxmlformats.org/drawingml/2006/main" xmlns:r="http://schemas.openxmlformats.org/officeDocument/2006/relationships" xmlns:p="http://schemas.openxmlformats.org/presentationml/2006/main">
+  <p:cSld>
+    <p:spTree>
+      <p:nvGrpSpPr>
+        <p:cNvPr id="1" name=""/>
+        <p:cNvGrpSpPr/>
+        <p:nvPr/>
+      </p:nvGrpSpPr>
+      <p:grpSpPr>
+        <a:xfrm>
+          <a:off x="0" y="0"/>
+          <a:ext cx="0" cy="0"/>
+          <a:chOff x="0" y="0"/>
+          <a:chExt cx="0" cy="0"/>
+        </a:xfrm>
+      </p:grpSpPr>
+      <p:sp>
+        <p:nvSpPr>
+          <p:cNvPr id="2" name="Title 1"/>
+          <p:cNvSpPr>
+            <a:spLocks noGrp="1"/>
+          </p:cNvSpPr>
+          <p:nvPr>
+            <p:ph type="title"/>
+          </p:nvPr>
+        </p:nvSpPr>
+        <p:spPr/>
+        <p:txBody>
+          <a:bodyPr/>
+          <a:lstStyle/>
+          <a:p>
+            <a:r>
+              <a:rPr lang="en-US" dirty="0" smtClean="0"/>
+              <a:t>Resources</a:t>
+            </a:r>
+            <a:endParaRPr lang="en-US" dirty="0"/>
+          </a:p>
+        </p:txBody>
+      </p:sp>
+      <p:sp>
+        <p:nvSpPr>
+          <p:cNvPr id="3" name="Content Placeholder 2"/>
+          <p:cNvSpPr>
+            <a:spLocks noGrp="1"/>
+          </p:cNvSpPr>
+          <p:nvPr>
+            <p:ph idx="1"/>
+          </p:nvPr>
+        </p:nvSpPr>
+        <p:spPr>
+          <a:xfrm>
+            <a:off x="457200" y="1600200"/>
+            <a:ext cx="8686800" cy="4525963"/>
+          </a:xfrm>
+        </p:spPr>
+        <p:txBody>
+          <a:bodyPr/>
+          <a:lstStyle/>
+          <a:p>
+            <a:r>
+              <a:rPr lang="en-US" dirty="0" smtClean="0"/>
+              <a:t>Manuals</a:t>
+            </a:r>
+          </a:p>
+          <a:p>
+            <a:pPr lvl="1"/>
+            <a:r>
+              <a:rPr lang="en-US" sz="1800" dirty="0" smtClean="0">
+                <a:hlinkClick r:id="rId2"/>
+              </a:rPr>
+              <a:t>http</a:t>
+            </a:r>
+            <a:r>
+              <a:rPr lang="en-US" sz="1800" dirty="0">
+                <a:hlinkClick r:id="rId2"/>
+              </a:rPr>
+              <a:t>://www.gnu.org/software/make/manual/</a:t>
+            </a:r>
+            <a:r>
+              <a:rPr lang="en-US" sz="1800" dirty="0" smtClean="0">
+                <a:hlinkClick r:id="rId2"/>
+              </a:rPr>
+              <a:t>make.html</a:t>
+            </a:r>
+            <a:endParaRPr lang="en-US" sz="1800" dirty="0" smtClean="0"/>
+          </a:p>
+          <a:p>
+            <a:pPr lvl="1"/>
+            <a:r>
+              <a:rPr lang="en-US" sz="1800" dirty="0">
+                <a:hlinkClick r:id="rId3"/>
+              </a:rPr>
+              <a:t>http://www.gnu.org/software/parallel/</a:t>
+            </a:r>
+            <a:r>
+              <a:rPr lang="en-US" sz="1800" dirty="0" smtClean="0">
+                <a:hlinkClick r:id="rId3"/>
+              </a:rPr>
+              <a:t>parallel_tutorial.html</a:t>
+            </a:r>
+            <a:endParaRPr lang="en-US" sz="1800" dirty="0" smtClean="0"/>
+          </a:p>
+          <a:p>
+            <a:r>
+              <a:rPr lang="en-US" dirty="0" smtClean="0">
+                <a:latin typeface="Consolas"/>
+                <a:cs typeface="Consolas"/>
+              </a:rPr>
+              <a:t>man make</a:t>
+            </a:r>
+          </a:p>
+          <a:p>
+            <a:r>
+              <a:rPr lang="en-US" dirty="0" smtClean="0">
+                <a:latin typeface="Consolas"/>
+                <a:cs typeface="Consolas"/>
+              </a:rPr>
+              <a:t>man parallel</a:t>
+            </a:r>
+          </a:p>
+          <a:p>
+            <a:r>
+              <a:rPr lang="en-US" dirty="0" smtClean="0"/>
+              <a:t>Ply me with donuts, or just ask nicely</a:t>
+            </a:r>
+            <a:endParaRPr lang="en-US" dirty="0"/>
+          </a:p>
+        </p:txBody>
+      </p:sp>
+    </p:spTree>
+    <p:extLst>
+      <p:ext uri="{BB962C8B-B14F-4D97-AF65-F5344CB8AC3E}">
+        <p14:creationId xmlns:p14="http://schemas.microsoft.com/office/powerpoint/2010/main" val="2733509859"/>
+      </p:ext>
+    </p:extLst>
+  </p:cSld>
+  <p:clrMapOvr>
+    <a:masterClrMapping/>
+  </p:clrMapOvr>
 </p:sld>
 </file>
 
@@ -12727,13 +13783,15 @@
               <a:rPr lang="en-US" dirty="0" smtClean="0">
                 <a:cs typeface="Consolas"/>
               </a:rPr>
-              <a:t>Language </a:t>
-            </a:r>
+              <a:t>Language agnostic</a:t>
+            </a:r>
+          </a:p>
+          <a:p>
             <a:r>
               <a:rPr lang="en-US" dirty="0" smtClean="0">
                 <a:cs typeface="Consolas"/>
               </a:rPr>
-              <a:t>agnostic</a:t>
+              <a:t>Only does the work necessary</a:t>
             </a:r>
           </a:p>
           <a:p>
@@ -12741,7 +13799,7 @@
               <a:rPr lang="en-US" dirty="0" smtClean="0">
                 <a:cs typeface="Consolas"/>
               </a:rPr>
-              <a:t>Only does the work necessary</a:t>
+              <a:t>Stops on error</a:t>
             </a:r>
           </a:p>
           <a:p>
@@ -13249,10 +14307,6 @@
               </a:rPr>
               <a:t>	        -frame 1 -clean</a:t>
             </a:r>
-            <a:endParaRPr lang="en-US" dirty="0">
-              <a:latin typeface="Consolas"/>
-              <a:cs typeface="Consolas"/>
-            </a:endParaRPr>
           </a:p>
         </p:txBody>
       </p:sp>
@@ -13621,10 +14675,6 @@
               </a:rPr>
               <a:t>	        -frame 1 -clean</a:t>
             </a:r>
-            <a:endParaRPr lang="en-US" dirty="0">
-              <a:latin typeface="Consolas"/>
-              <a:cs typeface="Consolas"/>
-            </a:endParaRPr>
           </a:p>
         </p:txBody>
       </p:sp>
@@ -13922,14 +14972,7 @@
                 <a:latin typeface="Consolas"/>
                 <a:cs typeface="Consolas"/>
               </a:rPr>
-              <a:t>	</a:t>
-            </a:r>
-            <a:r>
-              <a:rPr lang="en-US" sz="2400" dirty="0">
-                <a:latin typeface="Consolas"/>
-                <a:cs typeface="Consolas"/>
-              </a:rPr>
-              <a:t>muscle -quiet </a:t>
+              <a:t>	muscle -quiet </a:t>
             </a:r>
             <a:r>
               <a:rPr lang="en-US" sz="2400" dirty="0">
@@ -14221,14 +15264,7 @@
                 <a:latin typeface="Consolas"/>
                 <a:cs typeface="Consolas"/>
               </a:rPr>
-              <a:t> </a:t>
-            </a:r>
-            <a:r>
-              <a:rPr lang="en-US" sz="2400" dirty="0" smtClean="0">
-                <a:latin typeface="Consolas"/>
-                <a:cs typeface="Consolas"/>
-              </a:rPr>
-              <a:t>0.25 0.5</a:t>
+              <a:t> 0.25 0.5</a:t>
             </a:r>
           </a:p>
           <a:p>

</xml_diff>